<commit_message>
SSS process pictures updated
</commit_message>
<xml_diff>
--- a/reports/RequirementsBaseline-SSS/images/dataDrivenBufferProcess.pptx
+++ b/reports/RequirementsBaseline-SSS/images/dataDrivenBufferProcess.pptx
@@ -6,6 +6,7 @@
   </p:sldMasterIdLst>
   <p:sldIdLst>
     <p:sldId id="256" r:id="rId2"/>
+    <p:sldId id="257" r:id="rId3"/>
   </p:sldIdLst>
   <p:sldSz cx="3024188" cy="2700338"/>
   <p:notesSz cx="6858000" cy="9144000"/>
@@ -6780,6 +6781,3694 @@
 </p:sld>
 </file>
 
+<file path=ppt/slides/slide2.xml><?xml version="1.0" encoding="utf-8"?>
+<p:sld xmlns:a="http://schemas.openxmlformats.org/drawingml/2006/main" xmlns:r="http://schemas.openxmlformats.org/officeDocument/2006/relationships" xmlns:p="http://schemas.openxmlformats.org/presentationml/2006/main">
+  <p:cSld>
+    <p:spTree>
+      <p:nvGrpSpPr>
+        <p:cNvPr id="1" name=""/>
+        <p:cNvGrpSpPr/>
+        <p:nvPr/>
+      </p:nvGrpSpPr>
+      <p:grpSpPr>
+        <a:xfrm>
+          <a:off x="0" y="0"/>
+          <a:ext cx="0" cy="0"/>
+          <a:chOff x="0" y="0"/>
+          <a:chExt cx="0" cy="0"/>
+        </a:xfrm>
+      </p:grpSpPr>
+      <p:cxnSp>
+        <p:nvCxnSpPr>
+          <p:cNvPr id="134" name="Straight Arrow Connector 133">
+            <a:extLst>
+              <a:ext uri="{FF2B5EF4-FFF2-40B4-BE49-F238E27FC236}">
+                <a16:creationId xmlns:a16="http://schemas.microsoft.com/office/drawing/2014/main" id="{FB16BA5B-F22F-F747-8496-3B6023FCD990}"/>
+              </a:ext>
+            </a:extLst>
+          </p:cNvPr>
+          <p:cNvCxnSpPr>
+            <a:cxnSpLocks/>
+          </p:cNvCxnSpPr>
+          <p:nvPr/>
+        </p:nvCxnSpPr>
+        <p:spPr>
+          <a:xfrm flipH="1" flipV="1">
+            <a:off x="1798596" y="1838662"/>
+            <a:ext cx="153420" cy="8166"/>
+          </a:xfrm>
+          <a:prstGeom prst="straightConnector1">
+            <a:avLst/>
+          </a:prstGeom>
+          <a:ln w="28575">
+            <a:solidFill>
+              <a:schemeClr val="tx1"/>
+            </a:solidFill>
+            <a:tailEnd type="triangle"/>
+          </a:ln>
+        </p:spPr>
+        <p:style>
+          <a:lnRef idx="1">
+            <a:schemeClr val="accent1"/>
+          </a:lnRef>
+          <a:fillRef idx="0">
+            <a:schemeClr val="accent1"/>
+          </a:fillRef>
+          <a:effectRef idx="0">
+            <a:schemeClr val="accent1"/>
+          </a:effectRef>
+          <a:fontRef idx="minor">
+            <a:schemeClr val="tx1"/>
+          </a:fontRef>
+        </p:style>
+      </p:cxnSp>
+      <p:sp>
+        <p:nvSpPr>
+          <p:cNvPr id="135" name="Rounded Rectangle 134">
+            <a:extLst>
+              <a:ext uri="{FF2B5EF4-FFF2-40B4-BE49-F238E27FC236}">
+                <a16:creationId xmlns:a16="http://schemas.microsoft.com/office/drawing/2014/main" id="{6F58F6F7-D4BF-684F-B676-F738A5DD66CD}"/>
+              </a:ext>
+            </a:extLst>
+          </p:cNvPr>
+          <p:cNvSpPr/>
+          <p:nvPr/>
+        </p:nvSpPr>
+        <p:spPr>
+          <a:xfrm>
+            <a:off x="1972981" y="1798416"/>
+            <a:ext cx="399106" cy="165959"/>
+          </a:xfrm>
+          <a:prstGeom prst="roundRect">
+            <a:avLst/>
+          </a:prstGeom>
+          <a:solidFill>
+            <a:schemeClr val="bg1"/>
+          </a:solidFill>
+          <a:ln>
+            <a:solidFill>
+              <a:schemeClr val="tx1">
+                <a:lumMod val="50000"/>
+              </a:schemeClr>
+            </a:solidFill>
+          </a:ln>
+        </p:spPr>
+        <p:style>
+          <a:lnRef idx="2">
+            <a:schemeClr val="accent1">
+              <a:shade val="50000"/>
+            </a:schemeClr>
+          </a:lnRef>
+          <a:fillRef idx="1">
+            <a:schemeClr val="accent1"/>
+          </a:fillRef>
+          <a:effectRef idx="0">
+            <a:schemeClr val="accent1"/>
+          </a:effectRef>
+          <a:fontRef idx="minor">
+            <a:schemeClr val="lt1"/>
+          </a:fontRef>
+        </p:style>
+        <p:txBody>
+          <a:bodyPr rtlCol="0" anchor="ctr"/>
+          <a:lstStyle/>
+          <a:p>
+            <a:pPr algn="ctr"/>
+            <a:endParaRPr lang="en-LU"/>
+          </a:p>
+        </p:txBody>
+      </p:sp>
+      <p:cxnSp>
+        <p:nvCxnSpPr>
+          <p:cNvPr id="136" name="Straight Arrow Connector 135">
+            <a:extLst>
+              <a:ext uri="{FF2B5EF4-FFF2-40B4-BE49-F238E27FC236}">
+                <a16:creationId xmlns:a16="http://schemas.microsoft.com/office/drawing/2014/main" id="{B889B927-F700-5043-B364-ACF96F2BC06A}"/>
+              </a:ext>
+            </a:extLst>
+          </p:cNvPr>
+          <p:cNvCxnSpPr>
+            <a:cxnSpLocks/>
+          </p:cNvCxnSpPr>
+          <p:nvPr/>
+        </p:nvCxnSpPr>
+        <p:spPr>
+          <a:xfrm flipH="1" flipV="1">
+            <a:off x="1927478" y="1390803"/>
+            <a:ext cx="205044" cy="2328"/>
+          </a:xfrm>
+          <a:prstGeom prst="straightConnector1">
+            <a:avLst/>
+          </a:prstGeom>
+          <a:ln w="28575">
+            <a:solidFill>
+              <a:schemeClr val="tx1"/>
+            </a:solidFill>
+            <a:tailEnd type="triangle"/>
+          </a:ln>
+        </p:spPr>
+        <p:style>
+          <a:lnRef idx="1">
+            <a:schemeClr val="accent1"/>
+          </a:lnRef>
+          <a:fillRef idx="0">
+            <a:schemeClr val="accent1"/>
+          </a:fillRef>
+          <a:effectRef idx="0">
+            <a:schemeClr val="accent1"/>
+          </a:effectRef>
+          <a:fontRef idx="minor">
+            <a:schemeClr val="tx1"/>
+          </a:fontRef>
+        </p:style>
+      </p:cxnSp>
+      <p:sp>
+        <p:nvSpPr>
+          <p:cNvPr id="137" name="Rounded Rectangle 136">
+            <a:extLst>
+              <a:ext uri="{FF2B5EF4-FFF2-40B4-BE49-F238E27FC236}">
+                <a16:creationId xmlns:a16="http://schemas.microsoft.com/office/drawing/2014/main" id="{DA6F126C-DD2A-054F-A155-189DBA3BFD3B}"/>
+              </a:ext>
+            </a:extLst>
+          </p:cNvPr>
+          <p:cNvSpPr/>
+          <p:nvPr/>
+        </p:nvSpPr>
+        <p:spPr>
+          <a:xfrm>
+            <a:off x="2099702" y="1302887"/>
+            <a:ext cx="340011" cy="165959"/>
+          </a:xfrm>
+          <a:prstGeom prst="roundRect">
+            <a:avLst/>
+          </a:prstGeom>
+          <a:solidFill>
+            <a:schemeClr val="bg1"/>
+          </a:solidFill>
+          <a:ln>
+            <a:solidFill>
+              <a:schemeClr val="tx1">
+                <a:lumMod val="50000"/>
+              </a:schemeClr>
+            </a:solidFill>
+          </a:ln>
+        </p:spPr>
+        <p:style>
+          <a:lnRef idx="2">
+            <a:schemeClr val="accent1">
+              <a:shade val="50000"/>
+            </a:schemeClr>
+          </a:lnRef>
+          <a:fillRef idx="1">
+            <a:schemeClr val="accent1"/>
+          </a:fillRef>
+          <a:effectRef idx="0">
+            <a:schemeClr val="accent1"/>
+          </a:effectRef>
+          <a:fontRef idx="minor">
+            <a:schemeClr val="lt1"/>
+          </a:fontRef>
+        </p:style>
+        <p:txBody>
+          <a:bodyPr rtlCol="0" anchor="ctr"/>
+          <a:lstStyle/>
+          <a:p>
+            <a:pPr algn="ctr"/>
+            <a:endParaRPr lang="en-LU"/>
+          </a:p>
+        </p:txBody>
+      </p:sp>
+      <p:sp>
+        <p:nvSpPr>
+          <p:cNvPr id="138" name="Rounded Rectangle 137">
+            <a:extLst>
+              <a:ext uri="{FF2B5EF4-FFF2-40B4-BE49-F238E27FC236}">
+                <a16:creationId xmlns:a16="http://schemas.microsoft.com/office/drawing/2014/main" id="{0473749F-6618-8748-8354-391A0C914AF8}"/>
+              </a:ext>
+            </a:extLst>
+          </p:cNvPr>
+          <p:cNvSpPr/>
+          <p:nvPr/>
+        </p:nvSpPr>
+        <p:spPr>
+          <a:xfrm>
+            <a:off x="638740" y="1126574"/>
+            <a:ext cx="1870743" cy="1307414"/>
+          </a:xfrm>
+          <a:prstGeom prst="roundRect">
+            <a:avLst>
+              <a:gd name="adj" fmla="val 8260"/>
+            </a:avLst>
+          </a:prstGeom>
+          <a:noFill/>
+          <a:ln>
+            <a:solidFill>
+              <a:schemeClr val="tx1">
+                <a:lumMod val="50000"/>
+              </a:schemeClr>
+            </a:solidFill>
+          </a:ln>
+        </p:spPr>
+        <p:style>
+          <a:lnRef idx="2">
+            <a:schemeClr val="accent1">
+              <a:shade val="50000"/>
+            </a:schemeClr>
+          </a:lnRef>
+          <a:fillRef idx="1">
+            <a:schemeClr val="accent1"/>
+          </a:fillRef>
+          <a:effectRef idx="0">
+            <a:schemeClr val="accent1"/>
+          </a:effectRef>
+          <a:fontRef idx="minor">
+            <a:schemeClr val="lt1"/>
+          </a:fontRef>
+        </p:style>
+        <p:txBody>
+          <a:bodyPr rtlCol="0" anchor="ctr"/>
+          <a:lstStyle/>
+          <a:p>
+            <a:pPr algn="ctr"/>
+            <a:endParaRPr lang="en-LU"/>
+          </a:p>
+        </p:txBody>
+      </p:sp>
+      <p:sp>
+        <p:nvSpPr>
+          <p:cNvPr id="207" name="TextBox 206">
+            <a:extLst>
+              <a:ext uri="{FF2B5EF4-FFF2-40B4-BE49-F238E27FC236}">
+                <a16:creationId xmlns:a16="http://schemas.microsoft.com/office/drawing/2014/main" id="{C3929AA4-3567-4746-835A-786E6385683C}"/>
+              </a:ext>
+            </a:extLst>
+          </p:cNvPr>
+          <p:cNvSpPr txBox="1"/>
+          <p:nvPr/>
+        </p:nvSpPr>
+        <p:spPr>
+          <a:xfrm>
+            <a:off x="1734250" y="15154"/>
+            <a:ext cx="1258678" cy="184666"/>
+          </a:xfrm>
+          <a:prstGeom prst="rect">
+            <a:avLst/>
+          </a:prstGeom>
+          <a:noFill/>
+        </p:spPr>
+        <p:txBody>
+          <a:bodyPr wrap="none" rtlCol="0">
+            <a:spAutoFit/>
+          </a:bodyPr>
+          <a:lstStyle/>
+          <a:p>
+            <a:r>
+              <a:rPr lang="en-LU" sz="600" dirty="0">
+                <a:latin typeface="Arial" panose="020B0604020202020204" pitchFamily="34" charset="0"/>
+                <a:cs typeface="Arial" panose="020B0604020202020204" pitchFamily="34" charset="0"/>
+              </a:rPr>
+              <a:t>Step2. Generate Assertion API</a:t>
+            </a:r>
+          </a:p>
+        </p:txBody>
+      </p:sp>
+      <p:sp>
+        <p:nvSpPr>
+          <p:cNvPr id="209" name="TextBox 208">
+            <a:extLst>
+              <a:ext uri="{FF2B5EF4-FFF2-40B4-BE49-F238E27FC236}">
+                <a16:creationId xmlns:a16="http://schemas.microsoft.com/office/drawing/2014/main" id="{17A6656E-790B-504C-B1D4-A6DCA54E0E54}"/>
+              </a:ext>
+            </a:extLst>
+          </p:cNvPr>
+          <p:cNvSpPr txBox="1"/>
+          <p:nvPr/>
+        </p:nvSpPr>
+        <p:spPr>
+          <a:xfrm>
+            <a:off x="1861648" y="804508"/>
+            <a:ext cx="684803" cy="184666"/>
+          </a:xfrm>
+          <a:prstGeom prst="rect">
+            <a:avLst/>
+          </a:prstGeom>
+          <a:noFill/>
+        </p:spPr>
+        <p:txBody>
+          <a:bodyPr wrap="none" rtlCol="0">
+            <a:spAutoFit/>
+          </a:bodyPr>
+          <a:lstStyle/>
+          <a:p>
+            <a:r>
+              <a:rPr lang="en-LU" sz="600" dirty="0">
+                <a:latin typeface="Arial" panose="020B0604020202020204" pitchFamily="34" charset="0"/>
+                <a:cs typeface="Arial" panose="020B0604020202020204" pitchFamily="34" charset="0"/>
+              </a:rPr>
+              <a:t>  Insert Probes</a:t>
+            </a:r>
+          </a:p>
+        </p:txBody>
+      </p:sp>
+      <p:sp>
+        <p:nvSpPr>
+          <p:cNvPr id="210" name="TextBox 209">
+            <a:extLst>
+              <a:ext uri="{FF2B5EF4-FFF2-40B4-BE49-F238E27FC236}">
+                <a16:creationId xmlns:a16="http://schemas.microsoft.com/office/drawing/2014/main" id="{72A67B4A-F860-8B4D-BAB8-5625E93373BA}"/>
+              </a:ext>
+            </a:extLst>
+          </p:cNvPr>
+          <p:cNvSpPr txBox="1"/>
+          <p:nvPr/>
+        </p:nvSpPr>
+        <p:spPr>
+          <a:xfrm>
+            <a:off x="22362" y="341160"/>
+            <a:ext cx="1008609" cy="184666"/>
+          </a:xfrm>
+          <a:prstGeom prst="rect">
+            <a:avLst/>
+          </a:prstGeom>
+          <a:noFill/>
+        </p:spPr>
+        <p:txBody>
+          <a:bodyPr wrap="none" rtlCol="0">
+            <a:spAutoFit/>
+          </a:bodyPr>
+          <a:lstStyle/>
+          <a:p>
+            <a:r>
+              <a:rPr lang="en-LU" sz="600" dirty="0">
+                <a:latin typeface="Arial" panose="020B0604020202020204" pitchFamily="34" charset="0"/>
+                <a:cs typeface="Arial" panose="020B0604020202020204" pitchFamily="34" charset="0"/>
+              </a:rPr>
+              <a:t>Step4. Compile Mutants</a:t>
+            </a:r>
+          </a:p>
+        </p:txBody>
+      </p:sp>
+      <p:sp>
+        <p:nvSpPr>
+          <p:cNvPr id="211" name="TextBox 210">
+            <a:extLst>
+              <a:ext uri="{FF2B5EF4-FFF2-40B4-BE49-F238E27FC236}">
+                <a16:creationId xmlns:a16="http://schemas.microsoft.com/office/drawing/2014/main" id="{85ABB58F-BB1F-E547-A32B-E304D8CC5097}"/>
+              </a:ext>
+            </a:extLst>
+          </p:cNvPr>
+          <p:cNvSpPr txBox="1"/>
+          <p:nvPr/>
+        </p:nvSpPr>
+        <p:spPr>
+          <a:xfrm>
+            <a:off x="5844" y="1126972"/>
+            <a:ext cx="502061" cy="369332"/>
+          </a:xfrm>
+          <a:prstGeom prst="rect">
+            <a:avLst/>
+          </a:prstGeom>
+          <a:noFill/>
+        </p:spPr>
+        <p:txBody>
+          <a:bodyPr wrap="none" rtlCol="0">
+            <a:spAutoFit/>
+          </a:bodyPr>
+          <a:lstStyle/>
+          <a:p>
+            <a:r>
+              <a:rPr lang="en-LU" sz="600" dirty="0">
+                <a:latin typeface="Arial" panose="020B0604020202020204" pitchFamily="34" charset="0"/>
+                <a:cs typeface="Arial" panose="020B0604020202020204" pitchFamily="34" charset="0"/>
+              </a:rPr>
+              <a:t>Mutation </a:t>
+            </a:r>
+          </a:p>
+          <a:p>
+            <a:r>
+              <a:rPr lang="en-LU" sz="600" dirty="0">
+                <a:latin typeface="Arial" panose="020B0604020202020204" pitchFamily="34" charset="0"/>
+                <a:cs typeface="Arial" panose="020B0604020202020204" pitchFamily="34" charset="0"/>
+              </a:rPr>
+              <a:t>Analysis </a:t>
+            </a:r>
+          </a:p>
+          <a:p>
+            <a:r>
+              <a:rPr lang="en-LU" sz="600" dirty="0">
+                <a:latin typeface="Arial" panose="020B0604020202020204" pitchFamily="34" charset="0"/>
+                <a:cs typeface="Arial" panose="020B0604020202020204" pitchFamily="34" charset="0"/>
+              </a:rPr>
+              <a:t>Results</a:t>
+            </a:r>
+          </a:p>
+        </p:txBody>
+      </p:sp>
+      <p:sp>
+        <p:nvSpPr>
+          <p:cNvPr id="213" name="TextBox 212">
+            <a:extLst>
+              <a:ext uri="{FF2B5EF4-FFF2-40B4-BE49-F238E27FC236}">
+                <a16:creationId xmlns:a16="http://schemas.microsoft.com/office/drawing/2014/main" id="{E5B7F9C2-817B-CD48-971A-49CFA0C04D84}"/>
+              </a:ext>
+            </a:extLst>
+          </p:cNvPr>
+          <p:cNvSpPr txBox="1"/>
+          <p:nvPr/>
+        </p:nvSpPr>
+        <p:spPr>
+          <a:xfrm>
+            <a:off x="1001912" y="-23121"/>
+            <a:ext cx="481221" cy="461665"/>
+          </a:xfrm>
+          <a:prstGeom prst="rect">
+            <a:avLst/>
+          </a:prstGeom>
+          <a:noFill/>
+        </p:spPr>
+        <p:txBody>
+          <a:bodyPr wrap="none" rtlCol="0">
+            <a:spAutoFit/>
+          </a:bodyPr>
+          <a:lstStyle/>
+          <a:p>
+            <a:pPr algn="ctr"/>
+            <a:r>
+              <a:rPr lang="en-LU" sz="600" dirty="0">
+                <a:latin typeface="Arial" panose="020B0604020202020204" pitchFamily="34" charset="0"/>
+                <a:cs typeface="Arial" panose="020B0604020202020204" pitchFamily="34" charset="0"/>
+              </a:rPr>
+              <a:t>Mutation</a:t>
+            </a:r>
+          </a:p>
+          <a:p>
+            <a:pPr algn="ctr"/>
+            <a:r>
+              <a:rPr lang="en-LU" sz="600" dirty="0">
+                <a:latin typeface="Arial" panose="020B0604020202020204" pitchFamily="34" charset="0"/>
+                <a:cs typeface="Arial" panose="020B0604020202020204" pitchFamily="34" charset="0"/>
+              </a:rPr>
+              <a:t>Analysis</a:t>
+            </a:r>
+          </a:p>
+          <a:p>
+            <a:pPr algn="ctr"/>
+            <a:r>
+              <a:rPr lang="en-LU" sz="600" dirty="0">
+                <a:latin typeface="Arial" panose="020B0604020202020204" pitchFamily="34" charset="0"/>
+                <a:cs typeface="Arial" panose="020B0604020202020204" pitchFamily="34" charset="0"/>
+              </a:rPr>
+              <a:t>Results</a:t>
+            </a:r>
+          </a:p>
+          <a:p>
+            <a:pPr algn="ctr"/>
+            <a:endParaRPr lang="en-LU" sz="600" dirty="0">
+              <a:latin typeface="Arial" panose="020B0604020202020204" pitchFamily="34" charset="0"/>
+              <a:cs typeface="Arial" panose="020B0604020202020204" pitchFamily="34" charset="0"/>
+            </a:endParaRPr>
+          </a:p>
+        </p:txBody>
+      </p:sp>
+      <p:sp>
+        <p:nvSpPr>
+          <p:cNvPr id="215" name="Parallelogram 214">
+            <a:extLst>
+              <a:ext uri="{FF2B5EF4-FFF2-40B4-BE49-F238E27FC236}">
+                <a16:creationId xmlns:a16="http://schemas.microsoft.com/office/drawing/2014/main" id="{CF60135F-66B7-BD4E-857D-D9C718806BD1}"/>
+              </a:ext>
+            </a:extLst>
+          </p:cNvPr>
+          <p:cNvSpPr/>
+          <p:nvPr/>
+        </p:nvSpPr>
+        <p:spPr>
+          <a:xfrm>
+            <a:off x="925153" y="21718"/>
+            <a:ext cx="612012" cy="284222"/>
+          </a:xfrm>
+          <a:prstGeom prst="parallelogram">
+            <a:avLst/>
+          </a:prstGeom>
+          <a:noFill/>
+          <a:ln>
+            <a:solidFill>
+              <a:schemeClr val="tx1">
+                <a:lumMod val="50000"/>
+              </a:schemeClr>
+            </a:solidFill>
+          </a:ln>
+        </p:spPr>
+        <p:style>
+          <a:lnRef idx="2">
+            <a:schemeClr val="accent1">
+              <a:shade val="50000"/>
+            </a:schemeClr>
+          </a:lnRef>
+          <a:fillRef idx="1">
+            <a:schemeClr val="accent1"/>
+          </a:fillRef>
+          <a:effectRef idx="0">
+            <a:schemeClr val="accent1"/>
+          </a:effectRef>
+          <a:fontRef idx="minor">
+            <a:schemeClr val="lt1"/>
+          </a:fontRef>
+        </p:style>
+        <p:txBody>
+          <a:bodyPr rtlCol="0" anchor="ctr"/>
+          <a:lstStyle/>
+          <a:p>
+            <a:pPr algn="ctr"/>
+            <a:endParaRPr lang="en-LU" dirty="0"/>
+          </a:p>
+        </p:txBody>
+      </p:sp>
+      <p:sp>
+        <p:nvSpPr>
+          <p:cNvPr id="219" name="Rounded Rectangle 218">
+            <a:extLst>
+              <a:ext uri="{FF2B5EF4-FFF2-40B4-BE49-F238E27FC236}">
+                <a16:creationId xmlns:a16="http://schemas.microsoft.com/office/drawing/2014/main" id="{F4DB28F9-4253-2043-A1AC-54B02129562B}"/>
+              </a:ext>
+            </a:extLst>
+          </p:cNvPr>
+          <p:cNvSpPr/>
+          <p:nvPr/>
+        </p:nvSpPr>
+        <p:spPr>
+          <a:xfrm>
+            <a:off x="1816260" y="11722"/>
+            <a:ext cx="1086738" cy="184666"/>
+          </a:xfrm>
+          <a:prstGeom prst="roundRect">
+            <a:avLst/>
+          </a:prstGeom>
+          <a:noFill/>
+          <a:ln>
+            <a:solidFill>
+              <a:schemeClr val="tx1">
+                <a:lumMod val="50000"/>
+              </a:schemeClr>
+            </a:solidFill>
+          </a:ln>
+        </p:spPr>
+        <p:style>
+          <a:lnRef idx="2">
+            <a:schemeClr val="accent1">
+              <a:shade val="50000"/>
+            </a:schemeClr>
+          </a:lnRef>
+          <a:fillRef idx="1">
+            <a:schemeClr val="accent1"/>
+          </a:fillRef>
+          <a:effectRef idx="0">
+            <a:schemeClr val="accent1"/>
+          </a:effectRef>
+          <a:fontRef idx="minor">
+            <a:schemeClr val="lt1"/>
+          </a:fontRef>
+        </p:style>
+        <p:txBody>
+          <a:bodyPr rtlCol="0" anchor="ctr"/>
+          <a:lstStyle/>
+          <a:p>
+            <a:pPr algn="ctr"/>
+            <a:endParaRPr lang="en-LU"/>
+          </a:p>
+        </p:txBody>
+      </p:sp>
+      <p:sp>
+        <p:nvSpPr>
+          <p:cNvPr id="222" name="Rounded Rectangle 221">
+            <a:extLst>
+              <a:ext uri="{FF2B5EF4-FFF2-40B4-BE49-F238E27FC236}">
+                <a16:creationId xmlns:a16="http://schemas.microsoft.com/office/drawing/2014/main" id="{49F6E3FE-60D8-EE4D-8A9F-6BA27DF6E58F}"/>
+              </a:ext>
+            </a:extLst>
+          </p:cNvPr>
+          <p:cNvSpPr/>
+          <p:nvPr/>
+        </p:nvSpPr>
+        <p:spPr>
+          <a:xfrm>
+            <a:off x="1743103" y="799943"/>
+            <a:ext cx="1043529" cy="184666"/>
+          </a:xfrm>
+          <a:prstGeom prst="roundRect">
+            <a:avLst/>
+          </a:prstGeom>
+          <a:noFill/>
+          <a:ln>
+            <a:solidFill>
+              <a:schemeClr val="tx1">
+                <a:lumMod val="50000"/>
+              </a:schemeClr>
+            </a:solidFill>
+            <a:prstDash val="sysDot"/>
+          </a:ln>
+        </p:spPr>
+        <p:style>
+          <a:lnRef idx="2">
+            <a:schemeClr val="accent1">
+              <a:shade val="50000"/>
+            </a:schemeClr>
+          </a:lnRef>
+          <a:fillRef idx="1">
+            <a:schemeClr val="accent1"/>
+          </a:fillRef>
+          <a:effectRef idx="0">
+            <a:schemeClr val="accent1"/>
+          </a:effectRef>
+          <a:fontRef idx="minor">
+            <a:schemeClr val="lt1"/>
+          </a:fontRef>
+        </p:style>
+        <p:txBody>
+          <a:bodyPr rtlCol="0" anchor="ctr"/>
+          <a:lstStyle/>
+          <a:p>
+            <a:pPr algn="ctr"/>
+            <a:endParaRPr lang="en-LU"/>
+          </a:p>
+        </p:txBody>
+      </p:sp>
+      <p:sp>
+        <p:nvSpPr>
+          <p:cNvPr id="223" name="Rounded Rectangle 222">
+            <a:extLst>
+              <a:ext uri="{FF2B5EF4-FFF2-40B4-BE49-F238E27FC236}">
+                <a16:creationId xmlns:a16="http://schemas.microsoft.com/office/drawing/2014/main" id="{D1E286E6-AA8F-F64B-8299-045F0DAB7DE8}"/>
+              </a:ext>
+            </a:extLst>
+          </p:cNvPr>
+          <p:cNvSpPr/>
+          <p:nvPr/>
+        </p:nvSpPr>
+        <p:spPr>
+          <a:xfrm>
+            <a:off x="68996" y="343640"/>
+            <a:ext cx="1338184" cy="716244"/>
+          </a:xfrm>
+          <a:prstGeom prst="roundRect">
+            <a:avLst>
+              <a:gd name="adj" fmla="val 8260"/>
+            </a:avLst>
+          </a:prstGeom>
+          <a:noFill/>
+          <a:ln>
+            <a:solidFill>
+              <a:schemeClr val="tx1">
+                <a:lumMod val="50000"/>
+              </a:schemeClr>
+            </a:solidFill>
+          </a:ln>
+        </p:spPr>
+        <p:style>
+          <a:lnRef idx="2">
+            <a:schemeClr val="accent1">
+              <a:shade val="50000"/>
+            </a:schemeClr>
+          </a:lnRef>
+          <a:fillRef idx="1">
+            <a:schemeClr val="accent1"/>
+          </a:fillRef>
+          <a:effectRef idx="0">
+            <a:schemeClr val="accent1"/>
+          </a:effectRef>
+          <a:fontRef idx="minor">
+            <a:schemeClr val="lt1"/>
+          </a:fontRef>
+        </p:style>
+        <p:txBody>
+          <a:bodyPr rtlCol="0" anchor="ctr"/>
+          <a:lstStyle/>
+          <a:p>
+            <a:pPr algn="ctr"/>
+            <a:endParaRPr lang="en-LU"/>
+          </a:p>
+        </p:txBody>
+      </p:sp>
+      <p:sp>
+        <p:nvSpPr>
+          <p:cNvPr id="226" name="TextBox 225">
+            <a:extLst>
+              <a:ext uri="{FF2B5EF4-FFF2-40B4-BE49-F238E27FC236}">
+                <a16:creationId xmlns:a16="http://schemas.microsoft.com/office/drawing/2014/main" id="{89DE380B-96B0-1D4D-93C2-28F9E2597424}"/>
+              </a:ext>
+            </a:extLst>
+          </p:cNvPr>
+          <p:cNvSpPr txBox="1"/>
+          <p:nvPr/>
+        </p:nvSpPr>
+        <p:spPr>
+          <a:xfrm>
+            <a:off x="1943237" y="313648"/>
+            <a:ext cx="651140" cy="184666"/>
+          </a:xfrm>
+          <a:prstGeom prst="rect">
+            <a:avLst/>
+          </a:prstGeom>
+          <a:noFill/>
+        </p:spPr>
+        <p:txBody>
+          <a:bodyPr wrap="none" rtlCol="0">
+            <a:spAutoFit/>
+          </a:bodyPr>
+          <a:lstStyle/>
+          <a:p>
+            <a:pPr algn="ctr"/>
+            <a:r>
+              <a:rPr lang="en-LU" sz="600" dirty="0">
+                <a:latin typeface="Arial" panose="020B0604020202020204" pitchFamily="34" charset="0"/>
+                <a:cs typeface="Arial" panose="020B0604020202020204" pitchFamily="34" charset="0"/>
+              </a:rPr>
+              <a:t>Assertion API</a:t>
+            </a:r>
+          </a:p>
+        </p:txBody>
+      </p:sp>
+      <p:sp>
+        <p:nvSpPr>
+          <p:cNvPr id="227" name="Parallelogram 226">
+            <a:extLst>
+              <a:ext uri="{FF2B5EF4-FFF2-40B4-BE49-F238E27FC236}">
+                <a16:creationId xmlns:a16="http://schemas.microsoft.com/office/drawing/2014/main" id="{0B6A6792-DD59-E64D-972D-AC3F8C336DBA}"/>
+              </a:ext>
+            </a:extLst>
+          </p:cNvPr>
+          <p:cNvSpPr/>
+          <p:nvPr/>
+        </p:nvSpPr>
+        <p:spPr>
+          <a:xfrm>
+            <a:off x="1990650" y="286402"/>
+            <a:ext cx="591259" cy="207124"/>
+          </a:xfrm>
+          <a:prstGeom prst="parallelogram">
+            <a:avLst/>
+          </a:prstGeom>
+          <a:noFill/>
+          <a:ln>
+            <a:solidFill>
+              <a:schemeClr val="tx1">
+                <a:lumMod val="50000"/>
+              </a:schemeClr>
+            </a:solidFill>
+          </a:ln>
+        </p:spPr>
+        <p:style>
+          <a:lnRef idx="2">
+            <a:schemeClr val="accent1">
+              <a:shade val="50000"/>
+            </a:schemeClr>
+          </a:lnRef>
+          <a:fillRef idx="1">
+            <a:schemeClr val="accent1"/>
+          </a:fillRef>
+          <a:effectRef idx="0">
+            <a:schemeClr val="accent1"/>
+          </a:effectRef>
+          <a:fontRef idx="minor">
+            <a:schemeClr val="lt1"/>
+          </a:fontRef>
+        </p:style>
+        <p:txBody>
+          <a:bodyPr rtlCol="0" anchor="ctr"/>
+          <a:lstStyle/>
+          <a:p>
+            <a:pPr algn="ctr"/>
+            <a:endParaRPr lang="en-LU"/>
+          </a:p>
+        </p:txBody>
+      </p:sp>
+      <p:sp>
+        <p:nvSpPr>
+          <p:cNvPr id="232" name="TextBox 231">
+            <a:extLst>
+              <a:ext uri="{FF2B5EF4-FFF2-40B4-BE49-F238E27FC236}">
+                <a16:creationId xmlns:a16="http://schemas.microsoft.com/office/drawing/2014/main" id="{FE7C6427-F7DB-444B-BB2B-E9E41CB19F03}"/>
+              </a:ext>
+            </a:extLst>
+          </p:cNvPr>
+          <p:cNvSpPr txBox="1"/>
+          <p:nvPr/>
+        </p:nvSpPr>
+        <p:spPr>
+          <a:xfrm>
+            <a:off x="2618067" y="522391"/>
+            <a:ext cx="338554" cy="184666"/>
+          </a:xfrm>
+          <a:prstGeom prst="rect">
+            <a:avLst/>
+          </a:prstGeom>
+          <a:noFill/>
+        </p:spPr>
+        <p:txBody>
+          <a:bodyPr wrap="square" rtlCol="0">
+            <a:spAutoFit/>
+          </a:bodyPr>
+          <a:lstStyle/>
+          <a:p>
+            <a:pPr algn="ctr"/>
+            <a:r>
+              <a:rPr lang="en-LU" sz="600" dirty="0">
+                <a:latin typeface="Arial" panose="020B0604020202020204" pitchFamily="34" charset="0"/>
+                <a:cs typeface="Arial" panose="020B0604020202020204" pitchFamily="34" charset="0"/>
+              </a:rPr>
+              <a:t>SUT</a:t>
+            </a:r>
+          </a:p>
+        </p:txBody>
+      </p:sp>
+      <p:sp>
+        <p:nvSpPr>
+          <p:cNvPr id="233" name="Parallelogram 232">
+            <a:extLst>
+              <a:ext uri="{FF2B5EF4-FFF2-40B4-BE49-F238E27FC236}">
+                <a16:creationId xmlns:a16="http://schemas.microsoft.com/office/drawing/2014/main" id="{399CC323-D2C2-2249-9156-7787854E938A}"/>
+              </a:ext>
+            </a:extLst>
+          </p:cNvPr>
+          <p:cNvSpPr/>
+          <p:nvPr/>
+        </p:nvSpPr>
+        <p:spPr>
+          <a:xfrm>
+            <a:off x="2609544" y="504888"/>
+            <a:ext cx="355600" cy="202169"/>
+          </a:xfrm>
+          <a:prstGeom prst="parallelogram">
+            <a:avLst/>
+          </a:prstGeom>
+          <a:noFill/>
+          <a:ln>
+            <a:solidFill>
+              <a:schemeClr val="tx1">
+                <a:lumMod val="50000"/>
+              </a:schemeClr>
+            </a:solidFill>
+          </a:ln>
+        </p:spPr>
+        <p:style>
+          <a:lnRef idx="2">
+            <a:schemeClr val="accent1">
+              <a:shade val="50000"/>
+            </a:schemeClr>
+          </a:lnRef>
+          <a:fillRef idx="1">
+            <a:schemeClr val="accent1"/>
+          </a:fillRef>
+          <a:effectRef idx="0">
+            <a:schemeClr val="accent1"/>
+          </a:effectRef>
+          <a:fontRef idx="minor">
+            <a:schemeClr val="lt1"/>
+          </a:fontRef>
+        </p:style>
+        <p:txBody>
+          <a:bodyPr rtlCol="0" anchor="ctr"/>
+          <a:lstStyle/>
+          <a:p>
+            <a:pPr algn="ctr"/>
+            <a:endParaRPr lang="en-LU"/>
+          </a:p>
+        </p:txBody>
+      </p:sp>
+      <p:sp>
+        <p:nvSpPr>
+          <p:cNvPr id="234" name="TextBox 233">
+            <a:extLst>
+              <a:ext uri="{FF2B5EF4-FFF2-40B4-BE49-F238E27FC236}">
+                <a16:creationId xmlns:a16="http://schemas.microsoft.com/office/drawing/2014/main" id="{96C545A7-EA7C-3F48-9D11-CF554C7FAA13}"/>
+              </a:ext>
+            </a:extLst>
+          </p:cNvPr>
+          <p:cNvSpPr txBox="1"/>
+          <p:nvPr/>
+        </p:nvSpPr>
+        <p:spPr>
+          <a:xfrm>
+            <a:off x="1472810" y="520740"/>
+            <a:ext cx="478016" cy="276999"/>
+          </a:xfrm>
+          <a:prstGeom prst="rect">
+            <a:avLst/>
+          </a:prstGeom>
+          <a:noFill/>
+        </p:spPr>
+        <p:txBody>
+          <a:bodyPr wrap="none" rtlCol="0">
+            <a:spAutoFit/>
+          </a:bodyPr>
+          <a:lstStyle/>
+          <a:p>
+            <a:pPr algn="ctr"/>
+            <a:r>
+              <a:rPr lang="en-LU" sz="600" dirty="0">
+                <a:latin typeface="Arial" panose="020B0604020202020204" pitchFamily="34" charset="0"/>
+                <a:cs typeface="Arial" panose="020B0604020202020204" pitchFamily="34" charset="0"/>
+              </a:rPr>
+              <a:t>Modified</a:t>
+            </a:r>
+          </a:p>
+          <a:p>
+            <a:pPr algn="ctr"/>
+            <a:r>
+              <a:rPr lang="en-LU" sz="600" dirty="0">
+                <a:latin typeface="Arial" panose="020B0604020202020204" pitchFamily="34" charset="0"/>
+                <a:cs typeface="Arial" panose="020B0604020202020204" pitchFamily="34" charset="0"/>
+              </a:rPr>
+              <a:t>SUT</a:t>
+            </a:r>
+          </a:p>
+        </p:txBody>
+      </p:sp>
+      <p:sp>
+        <p:nvSpPr>
+          <p:cNvPr id="235" name="Parallelogram 234">
+            <a:extLst>
+              <a:ext uri="{FF2B5EF4-FFF2-40B4-BE49-F238E27FC236}">
+                <a16:creationId xmlns:a16="http://schemas.microsoft.com/office/drawing/2014/main" id="{F8CCA0F1-0819-D64D-9FF8-F7E3DE7D3D56}"/>
+              </a:ext>
+            </a:extLst>
+          </p:cNvPr>
+          <p:cNvSpPr/>
+          <p:nvPr/>
+        </p:nvSpPr>
+        <p:spPr>
+          <a:xfrm>
+            <a:off x="1512342" y="551877"/>
+            <a:ext cx="446760" cy="202169"/>
+          </a:xfrm>
+          <a:prstGeom prst="parallelogram">
+            <a:avLst/>
+          </a:prstGeom>
+          <a:noFill/>
+          <a:ln>
+            <a:solidFill>
+              <a:schemeClr val="tx1">
+                <a:lumMod val="50000"/>
+              </a:schemeClr>
+            </a:solidFill>
+          </a:ln>
+        </p:spPr>
+        <p:style>
+          <a:lnRef idx="2">
+            <a:schemeClr val="accent1">
+              <a:shade val="50000"/>
+            </a:schemeClr>
+          </a:lnRef>
+          <a:fillRef idx="1">
+            <a:schemeClr val="accent1"/>
+          </a:fillRef>
+          <a:effectRef idx="0">
+            <a:schemeClr val="accent1"/>
+          </a:effectRef>
+          <a:fontRef idx="minor">
+            <a:schemeClr val="lt1"/>
+          </a:fontRef>
+        </p:style>
+        <p:txBody>
+          <a:bodyPr rtlCol="0" anchor="ctr"/>
+          <a:lstStyle/>
+          <a:p>
+            <a:pPr algn="ctr"/>
+            <a:endParaRPr lang="en-LU"/>
+          </a:p>
+        </p:txBody>
+      </p:sp>
+      <p:sp>
+        <p:nvSpPr>
+          <p:cNvPr id="237" name="TextBox 236">
+            <a:extLst>
+              <a:ext uri="{FF2B5EF4-FFF2-40B4-BE49-F238E27FC236}">
+                <a16:creationId xmlns:a16="http://schemas.microsoft.com/office/drawing/2014/main" id="{45AB7A54-0FFC-BC42-9097-39BB383CA183}"/>
+              </a:ext>
+            </a:extLst>
+          </p:cNvPr>
+          <p:cNvSpPr txBox="1"/>
+          <p:nvPr/>
+        </p:nvSpPr>
+        <p:spPr>
+          <a:xfrm>
+            <a:off x="141864" y="692575"/>
+            <a:ext cx="458780" cy="276999"/>
+          </a:xfrm>
+          <a:prstGeom prst="rect">
+            <a:avLst/>
+          </a:prstGeom>
+          <a:noFill/>
+        </p:spPr>
+        <p:txBody>
+          <a:bodyPr wrap="none" rtlCol="0">
+            <a:spAutoFit/>
+          </a:bodyPr>
+          <a:lstStyle/>
+          <a:p>
+            <a:pPr algn="ctr"/>
+            <a:r>
+              <a:rPr lang="en-LU" sz="600" dirty="0">
+                <a:latin typeface="Arial" panose="020B0604020202020204" pitchFamily="34" charset="0"/>
+                <a:cs typeface="Arial" panose="020B0604020202020204" pitchFamily="34" charset="0"/>
+              </a:rPr>
+              <a:t>SUT</a:t>
+            </a:r>
+          </a:p>
+          <a:p>
+            <a:pPr algn="ctr"/>
+            <a:r>
+              <a:rPr lang="en-LU" sz="600" dirty="0">
+                <a:latin typeface="Arial" panose="020B0604020202020204" pitchFamily="34" charset="0"/>
+                <a:cs typeface="Arial" panose="020B0604020202020204" pitchFamily="34" charset="0"/>
+              </a:rPr>
+              <a:t>Mutant i</a:t>
+            </a:r>
+          </a:p>
+        </p:txBody>
+      </p:sp>
+      <p:sp>
+        <p:nvSpPr>
+          <p:cNvPr id="238" name="Parallelogram 237">
+            <a:extLst>
+              <a:ext uri="{FF2B5EF4-FFF2-40B4-BE49-F238E27FC236}">
+                <a16:creationId xmlns:a16="http://schemas.microsoft.com/office/drawing/2014/main" id="{0498A7E5-4F5D-D24B-AA5A-473EB4588B25}"/>
+              </a:ext>
+            </a:extLst>
+          </p:cNvPr>
+          <p:cNvSpPr/>
+          <p:nvPr/>
+        </p:nvSpPr>
+        <p:spPr>
+          <a:xfrm>
+            <a:off x="163502" y="729991"/>
+            <a:ext cx="446760" cy="202169"/>
+          </a:xfrm>
+          <a:prstGeom prst="parallelogram">
+            <a:avLst/>
+          </a:prstGeom>
+          <a:noFill/>
+          <a:ln>
+            <a:solidFill>
+              <a:schemeClr val="tx1">
+                <a:lumMod val="50000"/>
+              </a:schemeClr>
+            </a:solidFill>
+          </a:ln>
+        </p:spPr>
+        <p:style>
+          <a:lnRef idx="2">
+            <a:schemeClr val="accent1">
+              <a:shade val="50000"/>
+            </a:schemeClr>
+          </a:lnRef>
+          <a:fillRef idx="1">
+            <a:schemeClr val="accent1"/>
+          </a:fillRef>
+          <a:effectRef idx="0">
+            <a:schemeClr val="accent1"/>
+          </a:effectRef>
+          <a:fontRef idx="minor">
+            <a:schemeClr val="lt1"/>
+          </a:fontRef>
+        </p:style>
+        <p:txBody>
+          <a:bodyPr rtlCol="0" anchor="ctr"/>
+          <a:lstStyle/>
+          <a:p>
+            <a:pPr algn="ctr"/>
+            <a:endParaRPr lang="en-LU"/>
+          </a:p>
+        </p:txBody>
+      </p:sp>
+      <p:sp>
+        <p:nvSpPr>
+          <p:cNvPr id="239" name="TextBox 238">
+            <a:extLst>
+              <a:ext uri="{FF2B5EF4-FFF2-40B4-BE49-F238E27FC236}">
+                <a16:creationId xmlns:a16="http://schemas.microsoft.com/office/drawing/2014/main" id="{D956CA18-A721-8D45-AFDA-E7B3337EA17E}"/>
+              </a:ext>
+            </a:extLst>
+          </p:cNvPr>
+          <p:cNvSpPr txBox="1"/>
+          <p:nvPr/>
+        </p:nvSpPr>
+        <p:spPr>
+          <a:xfrm>
+            <a:off x="843821" y="725458"/>
+            <a:ext cx="481222" cy="184666"/>
+          </a:xfrm>
+          <a:prstGeom prst="rect">
+            <a:avLst/>
+          </a:prstGeom>
+          <a:noFill/>
+        </p:spPr>
+        <p:txBody>
+          <a:bodyPr wrap="square" rtlCol="0">
+            <a:spAutoFit/>
+          </a:bodyPr>
+          <a:lstStyle/>
+          <a:p>
+            <a:r>
+              <a:rPr lang="en-LU" sz="600" dirty="0">
+                <a:latin typeface="Arial" panose="020B0604020202020204" pitchFamily="34" charset="0"/>
+                <a:cs typeface="Arial" panose="020B0604020202020204" pitchFamily="34" charset="0"/>
+              </a:rPr>
+              <a:t>Compile</a:t>
+            </a:r>
+          </a:p>
+        </p:txBody>
+      </p:sp>
+      <p:sp>
+        <p:nvSpPr>
+          <p:cNvPr id="240" name="Rounded Rectangle 239">
+            <a:extLst>
+              <a:ext uri="{FF2B5EF4-FFF2-40B4-BE49-F238E27FC236}">
+                <a16:creationId xmlns:a16="http://schemas.microsoft.com/office/drawing/2014/main" id="{E6E598DB-593B-954C-8805-15D6A4DBA214}"/>
+              </a:ext>
+            </a:extLst>
+          </p:cNvPr>
+          <p:cNvSpPr/>
+          <p:nvPr/>
+        </p:nvSpPr>
+        <p:spPr>
+          <a:xfrm>
+            <a:off x="874522" y="732870"/>
+            <a:ext cx="399106" cy="165959"/>
+          </a:xfrm>
+          <a:prstGeom prst="roundRect">
+            <a:avLst/>
+          </a:prstGeom>
+          <a:noFill/>
+          <a:ln>
+            <a:solidFill>
+              <a:schemeClr val="tx1">
+                <a:lumMod val="50000"/>
+              </a:schemeClr>
+            </a:solidFill>
+          </a:ln>
+        </p:spPr>
+        <p:style>
+          <a:lnRef idx="2">
+            <a:schemeClr val="accent1">
+              <a:shade val="50000"/>
+            </a:schemeClr>
+          </a:lnRef>
+          <a:fillRef idx="1">
+            <a:schemeClr val="accent1"/>
+          </a:fillRef>
+          <a:effectRef idx="0">
+            <a:schemeClr val="accent1"/>
+          </a:effectRef>
+          <a:fontRef idx="minor">
+            <a:schemeClr val="lt1"/>
+          </a:fontRef>
+        </p:style>
+        <p:txBody>
+          <a:bodyPr rtlCol="0" anchor="ctr"/>
+          <a:lstStyle/>
+          <a:p>
+            <a:pPr algn="ctr"/>
+            <a:endParaRPr lang="en-LU"/>
+          </a:p>
+        </p:txBody>
+      </p:sp>
+      <p:sp>
+        <p:nvSpPr>
+          <p:cNvPr id="241" name="Rounded Rectangle 240">
+            <a:extLst>
+              <a:ext uri="{FF2B5EF4-FFF2-40B4-BE49-F238E27FC236}">
+                <a16:creationId xmlns:a16="http://schemas.microsoft.com/office/drawing/2014/main" id="{4A83C80B-8DD9-7F42-B3FE-FA1019EC65D6}"/>
+              </a:ext>
+            </a:extLst>
+          </p:cNvPr>
+          <p:cNvSpPr/>
+          <p:nvPr/>
+        </p:nvSpPr>
+        <p:spPr>
+          <a:xfrm>
+            <a:off x="114840" y="518551"/>
+            <a:ext cx="1255052" cy="503823"/>
+          </a:xfrm>
+          <a:prstGeom prst="roundRect">
+            <a:avLst/>
+          </a:prstGeom>
+          <a:noFill/>
+          <a:ln>
+            <a:solidFill>
+              <a:schemeClr val="tx1">
+                <a:lumMod val="50000"/>
+              </a:schemeClr>
+            </a:solidFill>
+            <a:prstDash val="sysDash"/>
+          </a:ln>
+        </p:spPr>
+        <p:style>
+          <a:lnRef idx="2">
+            <a:schemeClr val="accent1">
+              <a:shade val="50000"/>
+            </a:schemeClr>
+          </a:lnRef>
+          <a:fillRef idx="1">
+            <a:schemeClr val="accent1"/>
+          </a:fillRef>
+          <a:effectRef idx="0">
+            <a:schemeClr val="accent1"/>
+          </a:effectRef>
+          <a:fontRef idx="minor">
+            <a:schemeClr val="lt1"/>
+          </a:fontRef>
+        </p:style>
+        <p:txBody>
+          <a:bodyPr rtlCol="0" anchor="ctr"/>
+          <a:lstStyle/>
+          <a:p>
+            <a:pPr algn="ctr"/>
+            <a:endParaRPr lang="en-LU"/>
+          </a:p>
+        </p:txBody>
+      </p:sp>
+      <p:sp>
+        <p:nvSpPr>
+          <p:cNvPr id="242" name="TextBox 241">
+            <a:extLst>
+              <a:ext uri="{FF2B5EF4-FFF2-40B4-BE49-F238E27FC236}">
+                <a16:creationId xmlns:a16="http://schemas.microsoft.com/office/drawing/2014/main" id="{7FD538B1-9E3B-AB48-A382-40C9F341ABB4}"/>
+              </a:ext>
+            </a:extLst>
+          </p:cNvPr>
+          <p:cNvSpPr txBox="1"/>
+          <p:nvPr/>
+        </p:nvSpPr>
+        <p:spPr>
+          <a:xfrm>
+            <a:off x="68996" y="518414"/>
+            <a:ext cx="1386918" cy="184666"/>
+          </a:xfrm>
+          <a:prstGeom prst="rect">
+            <a:avLst/>
+          </a:prstGeom>
+          <a:noFill/>
+        </p:spPr>
+        <p:txBody>
+          <a:bodyPr wrap="none" rtlCol="0">
+            <a:spAutoFit/>
+          </a:bodyPr>
+          <a:lstStyle/>
+          <a:p>
+            <a:r>
+              <a:rPr lang="en-US" sz="600" dirty="0">
+                <a:latin typeface="Arial" panose="020B0604020202020204" pitchFamily="34" charset="0"/>
+                <a:cs typeface="Arial" panose="020B0604020202020204" pitchFamily="34" charset="0"/>
+              </a:rPr>
+              <a:t>repeat for every</a:t>
+            </a:r>
+            <a:r>
+              <a:rPr lang="en-LU" sz="600" dirty="0">
+                <a:latin typeface="Arial" panose="020B0604020202020204" pitchFamily="34" charset="0"/>
+                <a:cs typeface="Arial" panose="020B0604020202020204" pitchFamily="34" charset="0"/>
+              </a:rPr>
+              <a:t> mutation operation</a:t>
+            </a:r>
+          </a:p>
+        </p:txBody>
+      </p:sp>
+      <p:cxnSp>
+        <p:nvCxnSpPr>
+          <p:cNvPr id="243" name="Straight Connector 242">
+            <a:extLst>
+              <a:ext uri="{FF2B5EF4-FFF2-40B4-BE49-F238E27FC236}">
+                <a16:creationId xmlns:a16="http://schemas.microsoft.com/office/drawing/2014/main" id="{B44BFFA4-660E-A643-A582-C471BC42CA74}"/>
+              </a:ext>
+            </a:extLst>
+          </p:cNvPr>
+          <p:cNvCxnSpPr>
+            <a:cxnSpLocks/>
+          </p:cNvCxnSpPr>
+          <p:nvPr/>
+        </p:nvCxnSpPr>
+        <p:spPr>
+          <a:xfrm>
+            <a:off x="114840" y="703080"/>
+            <a:ext cx="1255052" cy="0"/>
+          </a:xfrm>
+          <a:prstGeom prst="line">
+            <a:avLst/>
+          </a:prstGeom>
+          <a:ln>
+            <a:solidFill>
+              <a:schemeClr val="tx1"/>
+            </a:solidFill>
+            <a:prstDash val="dash"/>
+          </a:ln>
+        </p:spPr>
+        <p:style>
+          <a:lnRef idx="1">
+            <a:schemeClr val="accent1"/>
+          </a:lnRef>
+          <a:fillRef idx="0">
+            <a:schemeClr val="accent1"/>
+          </a:fillRef>
+          <a:effectRef idx="0">
+            <a:schemeClr val="accent1"/>
+          </a:effectRef>
+          <a:fontRef idx="minor">
+            <a:schemeClr val="tx1"/>
+          </a:fontRef>
+        </p:style>
+      </p:cxnSp>
+      <p:cxnSp>
+        <p:nvCxnSpPr>
+          <p:cNvPr id="245" name="Straight Arrow Connector 244">
+            <a:extLst>
+              <a:ext uri="{FF2B5EF4-FFF2-40B4-BE49-F238E27FC236}">
+                <a16:creationId xmlns:a16="http://schemas.microsoft.com/office/drawing/2014/main" id="{5973EFD7-F8D8-184B-83EC-C3959465944E}"/>
+              </a:ext>
+            </a:extLst>
+          </p:cNvPr>
+          <p:cNvCxnSpPr>
+            <a:cxnSpLocks/>
+          </p:cNvCxnSpPr>
+          <p:nvPr/>
+        </p:nvCxnSpPr>
+        <p:spPr>
+          <a:xfrm>
+            <a:off x="1562112" y="110942"/>
+            <a:ext cx="241760" cy="3764"/>
+          </a:xfrm>
+          <a:prstGeom prst="straightConnector1">
+            <a:avLst/>
+          </a:prstGeom>
+          <a:ln w="28575">
+            <a:solidFill>
+              <a:schemeClr val="tx1"/>
+            </a:solidFill>
+            <a:tailEnd type="triangle"/>
+          </a:ln>
+        </p:spPr>
+        <p:style>
+          <a:lnRef idx="1">
+            <a:schemeClr val="accent1"/>
+          </a:lnRef>
+          <a:fillRef idx="0">
+            <a:schemeClr val="accent1"/>
+          </a:fillRef>
+          <a:effectRef idx="0">
+            <a:schemeClr val="accent1"/>
+          </a:effectRef>
+          <a:fontRef idx="minor">
+            <a:schemeClr val="tx1"/>
+          </a:fontRef>
+        </p:style>
+      </p:cxnSp>
+      <p:cxnSp>
+        <p:nvCxnSpPr>
+          <p:cNvPr id="246" name="Straight Arrow Connector 245">
+            <a:extLst>
+              <a:ext uri="{FF2B5EF4-FFF2-40B4-BE49-F238E27FC236}">
+                <a16:creationId xmlns:a16="http://schemas.microsoft.com/office/drawing/2014/main" id="{E0D0D426-011F-104A-943E-ACED93B79C67}"/>
+              </a:ext>
+            </a:extLst>
+          </p:cNvPr>
+          <p:cNvCxnSpPr>
+            <a:cxnSpLocks/>
+          </p:cNvCxnSpPr>
+          <p:nvPr/>
+        </p:nvCxnSpPr>
+        <p:spPr>
+          <a:xfrm>
+            <a:off x="2274687" y="181010"/>
+            <a:ext cx="0" cy="198742"/>
+          </a:xfrm>
+          <a:prstGeom prst="straightConnector1">
+            <a:avLst/>
+          </a:prstGeom>
+          <a:ln w="28575">
+            <a:solidFill>
+              <a:schemeClr val="tx1"/>
+            </a:solidFill>
+            <a:tailEnd type="triangle"/>
+          </a:ln>
+        </p:spPr>
+        <p:style>
+          <a:lnRef idx="1">
+            <a:schemeClr val="accent1"/>
+          </a:lnRef>
+          <a:fillRef idx="0">
+            <a:schemeClr val="accent1"/>
+          </a:fillRef>
+          <a:effectRef idx="0">
+            <a:schemeClr val="accent1"/>
+          </a:effectRef>
+          <a:fontRef idx="minor">
+            <a:schemeClr val="tx1"/>
+          </a:fontRef>
+        </p:style>
+      </p:cxnSp>
+      <p:cxnSp>
+        <p:nvCxnSpPr>
+          <p:cNvPr id="247" name="Straight Arrow Connector 246">
+            <a:extLst>
+              <a:ext uri="{FF2B5EF4-FFF2-40B4-BE49-F238E27FC236}">
+                <a16:creationId xmlns:a16="http://schemas.microsoft.com/office/drawing/2014/main" id="{38888158-ADB7-3A45-AFC6-1DE2BB209679}"/>
+              </a:ext>
+            </a:extLst>
+          </p:cNvPr>
+          <p:cNvCxnSpPr>
+            <a:cxnSpLocks/>
+            <a:stCxn id="232" idx="1"/>
+          </p:cNvCxnSpPr>
+          <p:nvPr/>
+        </p:nvCxnSpPr>
+        <p:spPr>
+          <a:xfrm flipH="1">
+            <a:off x="2434777" y="614724"/>
+            <a:ext cx="183290" cy="204221"/>
+          </a:xfrm>
+          <a:prstGeom prst="straightConnector1">
+            <a:avLst/>
+          </a:prstGeom>
+          <a:ln w="28575">
+            <a:solidFill>
+              <a:schemeClr val="tx1"/>
+            </a:solidFill>
+            <a:tailEnd type="triangle"/>
+          </a:ln>
+        </p:spPr>
+        <p:style>
+          <a:lnRef idx="1">
+            <a:schemeClr val="accent1"/>
+          </a:lnRef>
+          <a:fillRef idx="0">
+            <a:schemeClr val="accent1"/>
+          </a:fillRef>
+          <a:effectRef idx="0">
+            <a:schemeClr val="accent1"/>
+          </a:effectRef>
+          <a:fontRef idx="minor">
+            <a:schemeClr val="tx1"/>
+          </a:fontRef>
+        </p:style>
+      </p:cxnSp>
+      <p:cxnSp>
+        <p:nvCxnSpPr>
+          <p:cNvPr id="248" name="Straight Arrow Connector 247">
+            <a:extLst>
+              <a:ext uri="{FF2B5EF4-FFF2-40B4-BE49-F238E27FC236}">
+                <a16:creationId xmlns:a16="http://schemas.microsoft.com/office/drawing/2014/main" id="{96BA1631-6BAF-3B4B-B190-96A62D85CD9F}"/>
+              </a:ext>
+            </a:extLst>
+          </p:cNvPr>
+          <p:cNvCxnSpPr>
+            <a:cxnSpLocks/>
+          </p:cNvCxnSpPr>
+          <p:nvPr/>
+        </p:nvCxnSpPr>
+        <p:spPr>
+          <a:xfrm flipH="1" flipV="1">
+            <a:off x="1940521" y="660078"/>
+            <a:ext cx="154402" cy="172766"/>
+          </a:xfrm>
+          <a:prstGeom prst="straightConnector1">
+            <a:avLst/>
+          </a:prstGeom>
+          <a:ln w="28575">
+            <a:solidFill>
+              <a:schemeClr val="tx1"/>
+            </a:solidFill>
+            <a:tailEnd type="triangle"/>
+          </a:ln>
+        </p:spPr>
+        <p:style>
+          <a:lnRef idx="1">
+            <a:schemeClr val="accent1"/>
+          </a:lnRef>
+          <a:fillRef idx="0">
+            <a:schemeClr val="accent1"/>
+          </a:fillRef>
+          <a:effectRef idx="0">
+            <a:schemeClr val="accent1"/>
+          </a:effectRef>
+          <a:fontRef idx="minor">
+            <a:schemeClr val="tx1"/>
+          </a:fontRef>
+        </p:style>
+      </p:cxnSp>
+      <p:cxnSp>
+        <p:nvCxnSpPr>
+          <p:cNvPr id="249" name="Straight Arrow Connector 248">
+            <a:extLst>
+              <a:ext uri="{FF2B5EF4-FFF2-40B4-BE49-F238E27FC236}">
+                <a16:creationId xmlns:a16="http://schemas.microsoft.com/office/drawing/2014/main" id="{89EACA33-BD7E-C44A-B471-64A7A192D80E}"/>
+              </a:ext>
+            </a:extLst>
+          </p:cNvPr>
+          <p:cNvCxnSpPr>
+            <a:cxnSpLocks/>
+          </p:cNvCxnSpPr>
+          <p:nvPr/>
+        </p:nvCxnSpPr>
+        <p:spPr>
+          <a:xfrm flipH="1">
+            <a:off x="1259031" y="723242"/>
+            <a:ext cx="332402" cy="85314"/>
+          </a:xfrm>
+          <a:prstGeom prst="straightConnector1">
+            <a:avLst/>
+          </a:prstGeom>
+          <a:ln w="28575">
+            <a:solidFill>
+              <a:schemeClr val="tx1"/>
+            </a:solidFill>
+            <a:tailEnd type="triangle"/>
+          </a:ln>
+        </p:spPr>
+        <p:style>
+          <a:lnRef idx="1">
+            <a:schemeClr val="accent1"/>
+          </a:lnRef>
+          <a:fillRef idx="0">
+            <a:schemeClr val="accent1"/>
+          </a:fillRef>
+          <a:effectRef idx="0">
+            <a:schemeClr val="accent1"/>
+          </a:effectRef>
+          <a:fontRef idx="minor">
+            <a:schemeClr val="tx1"/>
+          </a:fontRef>
+        </p:style>
+      </p:cxnSp>
+      <p:cxnSp>
+        <p:nvCxnSpPr>
+          <p:cNvPr id="250" name="Straight Arrow Connector 249">
+            <a:extLst>
+              <a:ext uri="{FF2B5EF4-FFF2-40B4-BE49-F238E27FC236}">
+                <a16:creationId xmlns:a16="http://schemas.microsoft.com/office/drawing/2014/main" id="{B3FB6FE5-3F00-024E-B882-9CA871FCD3DD}"/>
+              </a:ext>
+            </a:extLst>
+          </p:cNvPr>
+          <p:cNvCxnSpPr>
+            <a:cxnSpLocks/>
+            <a:stCxn id="240" idx="1"/>
+            <a:endCxn id="238" idx="2"/>
+          </p:cNvCxnSpPr>
+          <p:nvPr/>
+        </p:nvCxnSpPr>
+        <p:spPr>
+          <a:xfrm flipH="1">
+            <a:off x="584991" y="815850"/>
+            <a:ext cx="289531" cy="15226"/>
+          </a:xfrm>
+          <a:prstGeom prst="straightConnector1">
+            <a:avLst/>
+          </a:prstGeom>
+          <a:ln w="28575">
+            <a:solidFill>
+              <a:schemeClr val="tx1"/>
+            </a:solidFill>
+            <a:tailEnd type="triangle"/>
+          </a:ln>
+        </p:spPr>
+        <p:style>
+          <a:lnRef idx="1">
+            <a:schemeClr val="accent1"/>
+          </a:lnRef>
+          <a:fillRef idx="0">
+            <a:schemeClr val="accent1"/>
+          </a:fillRef>
+          <a:effectRef idx="0">
+            <a:schemeClr val="accent1"/>
+          </a:effectRef>
+          <a:fontRef idx="minor">
+            <a:schemeClr val="tx1"/>
+          </a:fontRef>
+        </p:style>
+      </p:cxnSp>
+      <p:sp>
+        <p:nvSpPr>
+          <p:cNvPr id="251" name="TextBox 250">
+            <a:extLst>
+              <a:ext uri="{FF2B5EF4-FFF2-40B4-BE49-F238E27FC236}">
+                <a16:creationId xmlns:a16="http://schemas.microsoft.com/office/drawing/2014/main" id="{5DF706E1-B5FA-D64C-958E-CE82A26C19E8}"/>
+              </a:ext>
+            </a:extLst>
+          </p:cNvPr>
+          <p:cNvSpPr txBox="1"/>
+          <p:nvPr/>
+        </p:nvSpPr>
+        <p:spPr>
+          <a:xfrm>
+            <a:off x="618235" y="1119353"/>
+            <a:ext cx="1074333" cy="184666"/>
+          </a:xfrm>
+          <a:prstGeom prst="rect">
+            <a:avLst/>
+          </a:prstGeom>
+          <a:noFill/>
+        </p:spPr>
+        <p:txBody>
+          <a:bodyPr wrap="none" rtlCol="0">
+            <a:spAutoFit/>
+          </a:bodyPr>
+          <a:lstStyle/>
+          <a:p>
+            <a:r>
+              <a:rPr lang="en-LU" sz="600" dirty="0">
+                <a:latin typeface="Arial" panose="020B0604020202020204" pitchFamily="34" charset="0"/>
+                <a:cs typeface="Arial" panose="020B0604020202020204" pitchFamily="34" charset="0"/>
+              </a:rPr>
+              <a:t>Step5. Execute Test Suite</a:t>
+            </a:r>
+          </a:p>
+        </p:txBody>
+      </p:sp>
+      <p:sp>
+        <p:nvSpPr>
+          <p:cNvPr id="252" name="TextBox 251">
+            <a:extLst>
+              <a:ext uri="{FF2B5EF4-FFF2-40B4-BE49-F238E27FC236}">
+                <a16:creationId xmlns:a16="http://schemas.microsoft.com/office/drawing/2014/main" id="{120B2C4E-A10D-B44A-8BE8-FD850EB5C6BB}"/>
+              </a:ext>
+            </a:extLst>
+          </p:cNvPr>
+          <p:cNvSpPr txBox="1"/>
+          <p:nvPr/>
+        </p:nvSpPr>
+        <p:spPr>
+          <a:xfrm>
+            <a:off x="1353588" y="1744917"/>
+            <a:ext cx="458780" cy="276999"/>
+          </a:xfrm>
+          <a:prstGeom prst="rect">
+            <a:avLst/>
+          </a:prstGeom>
+          <a:noFill/>
+        </p:spPr>
+        <p:txBody>
+          <a:bodyPr wrap="none" rtlCol="0">
+            <a:spAutoFit/>
+          </a:bodyPr>
+          <a:lstStyle/>
+          <a:p>
+            <a:pPr algn="ctr"/>
+            <a:r>
+              <a:rPr lang="en-LU" sz="600" dirty="0">
+                <a:latin typeface="Arial" panose="020B0604020202020204" pitchFamily="34" charset="0"/>
+                <a:cs typeface="Arial" panose="020B0604020202020204" pitchFamily="34" charset="0"/>
+              </a:rPr>
+              <a:t>SUT</a:t>
+            </a:r>
+          </a:p>
+          <a:p>
+            <a:pPr algn="ctr"/>
+            <a:r>
+              <a:rPr lang="en-LU" sz="600" dirty="0">
+                <a:latin typeface="Arial" panose="020B0604020202020204" pitchFamily="34" charset="0"/>
+                <a:cs typeface="Arial" panose="020B0604020202020204" pitchFamily="34" charset="0"/>
+              </a:rPr>
+              <a:t>Mutant i</a:t>
+            </a:r>
+          </a:p>
+        </p:txBody>
+      </p:sp>
+      <p:sp>
+        <p:nvSpPr>
+          <p:cNvPr id="253" name="Parallelogram 252">
+            <a:extLst>
+              <a:ext uri="{FF2B5EF4-FFF2-40B4-BE49-F238E27FC236}">
+                <a16:creationId xmlns:a16="http://schemas.microsoft.com/office/drawing/2014/main" id="{47E92AF6-33B7-4243-BDE1-6550F4E2C285}"/>
+              </a:ext>
+            </a:extLst>
+          </p:cNvPr>
+          <p:cNvSpPr/>
+          <p:nvPr/>
+        </p:nvSpPr>
+        <p:spPr>
+          <a:xfrm>
+            <a:off x="1375226" y="1782333"/>
+            <a:ext cx="446760" cy="202169"/>
+          </a:xfrm>
+          <a:prstGeom prst="parallelogram">
+            <a:avLst/>
+          </a:prstGeom>
+          <a:noFill/>
+          <a:ln>
+            <a:solidFill>
+              <a:schemeClr val="tx1">
+                <a:lumMod val="50000"/>
+              </a:schemeClr>
+            </a:solidFill>
+          </a:ln>
+        </p:spPr>
+        <p:style>
+          <a:lnRef idx="2">
+            <a:schemeClr val="accent1">
+              <a:shade val="50000"/>
+            </a:schemeClr>
+          </a:lnRef>
+          <a:fillRef idx="1">
+            <a:schemeClr val="accent1"/>
+          </a:fillRef>
+          <a:effectRef idx="0">
+            <a:schemeClr val="accent1"/>
+          </a:effectRef>
+          <a:fontRef idx="minor">
+            <a:schemeClr val="lt1"/>
+          </a:fontRef>
+        </p:style>
+        <p:txBody>
+          <a:bodyPr rtlCol="0" anchor="ctr"/>
+          <a:lstStyle/>
+          <a:p>
+            <a:pPr algn="ctr"/>
+            <a:endParaRPr lang="en-LU"/>
+          </a:p>
+        </p:txBody>
+      </p:sp>
+      <p:sp>
+        <p:nvSpPr>
+          <p:cNvPr id="254" name="TextBox 253">
+            <a:extLst>
+              <a:ext uri="{FF2B5EF4-FFF2-40B4-BE49-F238E27FC236}">
+                <a16:creationId xmlns:a16="http://schemas.microsoft.com/office/drawing/2014/main" id="{AFF4592E-0B33-E640-9C85-9847E76F508D}"/>
+              </a:ext>
+            </a:extLst>
+          </p:cNvPr>
+          <p:cNvSpPr txBox="1"/>
+          <p:nvPr/>
+        </p:nvSpPr>
+        <p:spPr>
+          <a:xfrm>
+            <a:off x="1952016" y="1796327"/>
+            <a:ext cx="481222" cy="184666"/>
+          </a:xfrm>
+          <a:prstGeom prst="rect">
+            <a:avLst/>
+          </a:prstGeom>
+          <a:noFill/>
+        </p:spPr>
+        <p:txBody>
+          <a:bodyPr wrap="square" rtlCol="0">
+            <a:spAutoFit/>
+          </a:bodyPr>
+          <a:lstStyle/>
+          <a:p>
+            <a:r>
+              <a:rPr lang="en-LU" sz="600" dirty="0">
+                <a:latin typeface="Arial" panose="020B0604020202020204" pitchFamily="34" charset="0"/>
+                <a:cs typeface="Arial" panose="020B0604020202020204" pitchFamily="34" charset="0"/>
+              </a:rPr>
+              <a:t>Execute</a:t>
+            </a:r>
+          </a:p>
+        </p:txBody>
+      </p:sp>
+      <p:sp>
+        <p:nvSpPr>
+          <p:cNvPr id="255" name="Rounded Rectangle 254">
+            <a:extLst>
+              <a:ext uri="{FF2B5EF4-FFF2-40B4-BE49-F238E27FC236}">
+                <a16:creationId xmlns:a16="http://schemas.microsoft.com/office/drawing/2014/main" id="{EDFA2606-CE55-5746-821F-B9AE4DEEF365}"/>
+              </a:ext>
+            </a:extLst>
+          </p:cNvPr>
+          <p:cNvSpPr/>
+          <p:nvPr/>
+        </p:nvSpPr>
+        <p:spPr>
+          <a:xfrm>
+            <a:off x="723582" y="1596222"/>
+            <a:ext cx="1707321" cy="790266"/>
+          </a:xfrm>
+          <a:prstGeom prst="roundRect">
+            <a:avLst/>
+          </a:prstGeom>
+          <a:noFill/>
+          <a:ln>
+            <a:solidFill>
+              <a:schemeClr val="tx1">
+                <a:lumMod val="50000"/>
+              </a:schemeClr>
+            </a:solidFill>
+            <a:prstDash val="sysDash"/>
+          </a:ln>
+        </p:spPr>
+        <p:style>
+          <a:lnRef idx="2">
+            <a:schemeClr val="accent1">
+              <a:shade val="50000"/>
+            </a:schemeClr>
+          </a:lnRef>
+          <a:fillRef idx="1">
+            <a:schemeClr val="accent1"/>
+          </a:fillRef>
+          <a:effectRef idx="0">
+            <a:schemeClr val="accent1"/>
+          </a:effectRef>
+          <a:fontRef idx="minor">
+            <a:schemeClr val="lt1"/>
+          </a:fontRef>
+        </p:style>
+        <p:txBody>
+          <a:bodyPr rtlCol="0" anchor="ctr"/>
+          <a:lstStyle/>
+          <a:p>
+            <a:pPr algn="ctr"/>
+            <a:endParaRPr lang="en-LU"/>
+          </a:p>
+        </p:txBody>
+      </p:sp>
+      <p:sp>
+        <p:nvSpPr>
+          <p:cNvPr id="256" name="TextBox 255">
+            <a:extLst>
+              <a:ext uri="{FF2B5EF4-FFF2-40B4-BE49-F238E27FC236}">
+                <a16:creationId xmlns:a16="http://schemas.microsoft.com/office/drawing/2014/main" id="{51195F30-EA8D-934D-818E-6D8FD06BC82D}"/>
+              </a:ext>
+            </a:extLst>
+          </p:cNvPr>
+          <p:cNvSpPr txBox="1"/>
+          <p:nvPr/>
+        </p:nvSpPr>
+        <p:spPr>
+          <a:xfrm>
+            <a:off x="723583" y="1582677"/>
+            <a:ext cx="981359" cy="184666"/>
+          </a:xfrm>
+          <a:prstGeom prst="rect">
+            <a:avLst/>
+          </a:prstGeom>
+          <a:noFill/>
+        </p:spPr>
+        <p:txBody>
+          <a:bodyPr wrap="none" rtlCol="0">
+            <a:spAutoFit/>
+          </a:bodyPr>
+          <a:lstStyle/>
+          <a:p>
+            <a:r>
+              <a:rPr lang="en-US" sz="600" dirty="0">
+                <a:latin typeface="Arial" panose="020B0604020202020204" pitchFamily="34" charset="0"/>
+                <a:cs typeface="Arial" panose="020B0604020202020204" pitchFamily="34" charset="0"/>
+              </a:rPr>
+              <a:t>repeat for every mutant</a:t>
+            </a:r>
+            <a:endParaRPr lang="en-LU" sz="600" dirty="0">
+              <a:latin typeface="Arial" panose="020B0604020202020204" pitchFamily="34" charset="0"/>
+              <a:cs typeface="Arial" panose="020B0604020202020204" pitchFamily="34" charset="0"/>
+            </a:endParaRPr>
+          </a:p>
+        </p:txBody>
+      </p:sp>
+      <p:cxnSp>
+        <p:nvCxnSpPr>
+          <p:cNvPr id="257" name="Straight Connector 256">
+            <a:extLst>
+              <a:ext uri="{FF2B5EF4-FFF2-40B4-BE49-F238E27FC236}">
+                <a16:creationId xmlns:a16="http://schemas.microsoft.com/office/drawing/2014/main" id="{91B915E1-3E55-544F-A1F3-14B31DE55E41}"/>
+              </a:ext>
+            </a:extLst>
+          </p:cNvPr>
+          <p:cNvCxnSpPr>
+            <a:cxnSpLocks/>
+          </p:cNvCxnSpPr>
+          <p:nvPr/>
+        </p:nvCxnSpPr>
+        <p:spPr>
+          <a:xfrm flipV="1">
+            <a:off x="711862" y="1732195"/>
+            <a:ext cx="1686949" cy="12722"/>
+          </a:xfrm>
+          <a:prstGeom prst="line">
+            <a:avLst/>
+          </a:prstGeom>
+          <a:ln w="12700">
+            <a:solidFill>
+              <a:schemeClr val="tx1"/>
+            </a:solidFill>
+            <a:prstDash val="dash"/>
+          </a:ln>
+        </p:spPr>
+        <p:style>
+          <a:lnRef idx="1">
+            <a:schemeClr val="accent1"/>
+          </a:lnRef>
+          <a:fillRef idx="0">
+            <a:schemeClr val="accent1"/>
+          </a:fillRef>
+          <a:effectRef idx="0">
+            <a:schemeClr val="accent1"/>
+          </a:effectRef>
+          <a:fontRef idx="minor">
+            <a:schemeClr val="tx1"/>
+          </a:fontRef>
+        </p:style>
+      </p:cxnSp>
+      <p:cxnSp>
+        <p:nvCxnSpPr>
+          <p:cNvPr id="258" name="Straight Arrow Connector 257">
+            <a:extLst>
+              <a:ext uri="{FF2B5EF4-FFF2-40B4-BE49-F238E27FC236}">
+                <a16:creationId xmlns:a16="http://schemas.microsoft.com/office/drawing/2014/main" id="{DFCED11E-CF43-CB47-A68F-2401FBC8064A}"/>
+              </a:ext>
+            </a:extLst>
+          </p:cNvPr>
+          <p:cNvCxnSpPr>
+            <a:cxnSpLocks/>
+            <a:stCxn id="264" idx="5"/>
+          </p:cNvCxnSpPr>
+          <p:nvPr/>
+        </p:nvCxnSpPr>
+        <p:spPr>
+          <a:xfrm flipH="1">
+            <a:off x="1209624" y="1389461"/>
+            <a:ext cx="147767" cy="0"/>
+          </a:xfrm>
+          <a:prstGeom prst="straightConnector1">
+            <a:avLst/>
+          </a:prstGeom>
+          <a:ln w="28575">
+            <a:solidFill>
+              <a:schemeClr val="tx1"/>
+            </a:solidFill>
+            <a:tailEnd type="triangle"/>
+          </a:ln>
+        </p:spPr>
+        <p:style>
+          <a:lnRef idx="1">
+            <a:schemeClr val="accent1"/>
+          </a:lnRef>
+          <a:fillRef idx="0">
+            <a:schemeClr val="accent1"/>
+          </a:fillRef>
+          <a:effectRef idx="0">
+            <a:schemeClr val="accent1"/>
+          </a:effectRef>
+          <a:fontRef idx="minor">
+            <a:schemeClr val="tx1"/>
+          </a:fontRef>
+        </p:style>
+      </p:cxnSp>
+      <p:sp>
+        <p:nvSpPr>
+          <p:cNvPr id="259" name="TextBox 258">
+            <a:extLst>
+              <a:ext uri="{FF2B5EF4-FFF2-40B4-BE49-F238E27FC236}">
+                <a16:creationId xmlns:a16="http://schemas.microsoft.com/office/drawing/2014/main" id="{DA499C7B-D37E-2F49-A824-B01B6B9F6AC5}"/>
+              </a:ext>
+            </a:extLst>
+          </p:cNvPr>
+          <p:cNvSpPr txBox="1"/>
+          <p:nvPr/>
+        </p:nvSpPr>
+        <p:spPr>
+          <a:xfrm>
+            <a:off x="791795" y="1759810"/>
+            <a:ext cx="413895" cy="276999"/>
+          </a:xfrm>
+          <a:prstGeom prst="rect">
+            <a:avLst/>
+          </a:prstGeom>
+          <a:noFill/>
+        </p:spPr>
+        <p:txBody>
+          <a:bodyPr wrap="square" rtlCol="0">
+            <a:spAutoFit/>
+          </a:bodyPr>
+          <a:lstStyle/>
+          <a:p>
+            <a:pPr algn="ctr"/>
+            <a:r>
+              <a:rPr lang="en-LU" sz="600" dirty="0">
+                <a:latin typeface="Arial" panose="020B0604020202020204" pitchFamily="34" charset="0"/>
+                <a:cs typeface="Arial" panose="020B0604020202020204" pitchFamily="34" charset="0"/>
+              </a:rPr>
+              <a:t>Failing</a:t>
+            </a:r>
+          </a:p>
+          <a:p>
+            <a:pPr algn="ctr"/>
+            <a:r>
+              <a:rPr lang="en-LU" sz="600" dirty="0">
+                <a:latin typeface="Arial" panose="020B0604020202020204" pitchFamily="34" charset="0"/>
+                <a:cs typeface="Arial" panose="020B0604020202020204" pitchFamily="34" charset="0"/>
+              </a:rPr>
+              <a:t>Tests</a:t>
+            </a:r>
+          </a:p>
+        </p:txBody>
+      </p:sp>
+      <p:sp>
+        <p:nvSpPr>
+          <p:cNvPr id="260" name="Parallelogram 259">
+            <a:extLst>
+              <a:ext uri="{FF2B5EF4-FFF2-40B4-BE49-F238E27FC236}">
+                <a16:creationId xmlns:a16="http://schemas.microsoft.com/office/drawing/2014/main" id="{B086CDBC-DBB9-EF4A-A28D-418D235BA2E2}"/>
+              </a:ext>
+            </a:extLst>
+          </p:cNvPr>
+          <p:cNvSpPr/>
+          <p:nvPr/>
+        </p:nvSpPr>
+        <p:spPr>
+          <a:xfrm>
+            <a:off x="771741" y="1791197"/>
+            <a:ext cx="446760" cy="202169"/>
+          </a:xfrm>
+          <a:prstGeom prst="parallelogram">
+            <a:avLst/>
+          </a:prstGeom>
+          <a:noFill/>
+          <a:ln>
+            <a:solidFill>
+              <a:schemeClr val="tx1">
+                <a:lumMod val="50000"/>
+              </a:schemeClr>
+            </a:solidFill>
+          </a:ln>
+        </p:spPr>
+        <p:style>
+          <a:lnRef idx="2">
+            <a:schemeClr val="accent1">
+              <a:shade val="50000"/>
+            </a:schemeClr>
+          </a:lnRef>
+          <a:fillRef idx="1">
+            <a:schemeClr val="accent1"/>
+          </a:fillRef>
+          <a:effectRef idx="0">
+            <a:schemeClr val="accent1"/>
+          </a:effectRef>
+          <a:fontRef idx="minor">
+            <a:schemeClr val="lt1"/>
+          </a:fontRef>
+        </p:style>
+        <p:txBody>
+          <a:bodyPr rtlCol="0" anchor="ctr"/>
+          <a:lstStyle/>
+          <a:p>
+            <a:pPr algn="ctr"/>
+            <a:endParaRPr lang="en-LU"/>
+          </a:p>
+        </p:txBody>
+      </p:sp>
+      <p:sp>
+        <p:nvSpPr>
+          <p:cNvPr id="261" name="TextBox 260">
+            <a:extLst>
+              <a:ext uri="{FF2B5EF4-FFF2-40B4-BE49-F238E27FC236}">
+                <a16:creationId xmlns:a16="http://schemas.microsoft.com/office/drawing/2014/main" id="{06E27CC4-4984-B74C-B2A4-4D1177572E52}"/>
+              </a:ext>
+            </a:extLst>
+          </p:cNvPr>
+          <p:cNvSpPr txBox="1"/>
+          <p:nvPr/>
+        </p:nvSpPr>
+        <p:spPr>
+          <a:xfrm>
+            <a:off x="723584" y="2068811"/>
+            <a:ext cx="918068" cy="276999"/>
+          </a:xfrm>
+          <a:prstGeom prst="rect">
+            <a:avLst/>
+          </a:prstGeom>
+          <a:noFill/>
+        </p:spPr>
+        <p:txBody>
+          <a:bodyPr wrap="square" rtlCol="0">
+            <a:spAutoFit/>
+          </a:bodyPr>
+          <a:lstStyle/>
+          <a:p>
+            <a:pPr algn="ctr"/>
+            <a:r>
+              <a:rPr lang="en-LU" sz="600" dirty="0">
+                <a:latin typeface="Arial" panose="020B0604020202020204" pitchFamily="34" charset="0"/>
+                <a:cs typeface="Arial" panose="020B0604020202020204" pitchFamily="34" charset="0"/>
+              </a:rPr>
+              <a:t>Mutation Performed</a:t>
+            </a:r>
+            <a:br>
+              <a:rPr lang="en-LU" sz="600" dirty="0">
+                <a:latin typeface="Arial" panose="020B0604020202020204" pitchFamily="34" charset="0"/>
+                <a:cs typeface="Arial" panose="020B0604020202020204" pitchFamily="34" charset="0"/>
+              </a:rPr>
+            </a:br>
+            <a:r>
+              <a:rPr lang="en-LU" sz="600" dirty="0">
+                <a:latin typeface="Arial" panose="020B0604020202020204" pitchFamily="34" charset="0"/>
+                <a:cs typeface="Arial" panose="020B0604020202020204" pitchFamily="34" charset="0"/>
+              </a:rPr>
+              <a:t>(Y/N)</a:t>
+            </a:r>
+          </a:p>
+        </p:txBody>
+      </p:sp>
+      <p:sp>
+        <p:nvSpPr>
+          <p:cNvPr id="262" name="Parallelogram 261">
+            <a:extLst>
+              <a:ext uri="{FF2B5EF4-FFF2-40B4-BE49-F238E27FC236}">
+                <a16:creationId xmlns:a16="http://schemas.microsoft.com/office/drawing/2014/main" id="{75FF66F6-B8DE-C549-B4AC-C3EF31E0592E}"/>
+              </a:ext>
+            </a:extLst>
+          </p:cNvPr>
+          <p:cNvSpPr/>
+          <p:nvPr/>
+        </p:nvSpPr>
+        <p:spPr>
+          <a:xfrm>
+            <a:off x="775211" y="2106227"/>
+            <a:ext cx="809165" cy="218287"/>
+          </a:xfrm>
+          <a:prstGeom prst="parallelogram">
+            <a:avLst/>
+          </a:prstGeom>
+          <a:noFill/>
+          <a:ln>
+            <a:solidFill>
+              <a:schemeClr val="tx1">
+                <a:lumMod val="50000"/>
+              </a:schemeClr>
+            </a:solidFill>
+          </a:ln>
+        </p:spPr>
+        <p:style>
+          <a:lnRef idx="2">
+            <a:schemeClr val="accent1">
+              <a:shade val="50000"/>
+            </a:schemeClr>
+          </a:lnRef>
+          <a:fillRef idx="1">
+            <a:schemeClr val="accent1"/>
+          </a:fillRef>
+          <a:effectRef idx="0">
+            <a:schemeClr val="accent1"/>
+          </a:effectRef>
+          <a:fontRef idx="minor">
+            <a:schemeClr val="lt1"/>
+          </a:fontRef>
+        </p:style>
+        <p:txBody>
+          <a:bodyPr rtlCol="0" anchor="ctr"/>
+          <a:lstStyle/>
+          <a:p>
+            <a:pPr algn="ctr"/>
+            <a:endParaRPr lang="en-LU"/>
+          </a:p>
+        </p:txBody>
+      </p:sp>
+      <p:sp>
+        <p:nvSpPr>
+          <p:cNvPr id="263" name="TextBox 262">
+            <a:extLst>
+              <a:ext uri="{FF2B5EF4-FFF2-40B4-BE49-F238E27FC236}">
+                <a16:creationId xmlns:a16="http://schemas.microsoft.com/office/drawing/2014/main" id="{90D406A0-9E71-9E4F-9A90-49FE614A84E1}"/>
+              </a:ext>
+            </a:extLst>
+          </p:cNvPr>
+          <p:cNvSpPr txBox="1"/>
+          <p:nvPr/>
+        </p:nvSpPr>
+        <p:spPr>
+          <a:xfrm>
+            <a:off x="1296586" y="1250463"/>
+            <a:ext cx="764954" cy="369332"/>
+          </a:xfrm>
+          <a:prstGeom prst="rect">
+            <a:avLst/>
+          </a:prstGeom>
+          <a:noFill/>
+        </p:spPr>
+        <p:txBody>
+          <a:bodyPr wrap="none" rtlCol="0">
+            <a:spAutoFit/>
+          </a:bodyPr>
+          <a:lstStyle/>
+          <a:p>
+            <a:pPr algn="ctr"/>
+            <a:r>
+              <a:rPr lang="en-LU" sz="600" dirty="0">
+                <a:latin typeface="Arial" panose="020B0604020202020204" pitchFamily="34" charset="0"/>
+                <a:cs typeface="Arial" panose="020B0604020202020204" pitchFamily="34" charset="0"/>
+              </a:rPr>
+              <a:t>Mutant collecting</a:t>
+            </a:r>
+          </a:p>
+          <a:p>
+            <a:pPr algn="ctr"/>
+            <a:r>
+              <a:rPr lang="en-LU" sz="600" dirty="0">
+                <a:latin typeface="Arial" panose="020B0604020202020204" pitchFamily="34" charset="0"/>
+                <a:cs typeface="Arial" panose="020B0604020202020204" pitchFamily="34" charset="0"/>
+              </a:rPr>
+              <a:t>FM Coverage</a:t>
+            </a:r>
+          </a:p>
+          <a:p>
+            <a:pPr algn="ctr"/>
+            <a:endParaRPr lang="en-LU" sz="600" dirty="0">
+              <a:latin typeface="Arial" panose="020B0604020202020204" pitchFamily="34" charset="0"/>
+              <a:cs typeface="Arial" panose="020B0604020202020204" pitchFamily="34" charset="0"/>
+            </a:endParaRPr>
+          </a:p>
+        </p:txBody>
+      </p:sp>
+      <p:sp>
+        <p:nvSpPr>
+          <p:cNvPr id="264" name="Parallelogram 263">
+            <a:extLst>
+              <a:ext uri="{FF2B5EF4-FFF2-40B4-BE49-F238E27FC236}">
+                <a16:creationId xmlns:a16="http://schemas.microsoft.com/office/drawing/2014/main" id="{731DD9D1-7EB9-4149-805C-107F4E2F64B9}"/>
+              </a:ext>
+            </a:extLst>
+          </p:cNvPr>
+          <p:cNvSpPr/>
+          <p:nvPr/>
+        </p:nvSpPr>
+        <p:spPr>
+          <a:xfrm>
+            <a:off x="1332120" y="1288376"/>
+            <a:ext cx="681965" cy="202169"/>
+          </a:xfrm>
+          <a:prstGeom prst="parallelogram">
+            <a:avLst/>
+          </a:prstGeom>
+          <a:noFill/>
+          <a:ln>
+            <a:solidFill>
+              <a:schemeClr val="tx1">
+                <a:lumMod val="50000"/>
+              </a:schemeClr>
+            </a:solidFill>
+          </a:ln>
+        </p:spPr>
+        <p:style>
+          <a:lnRef idx="2">
+            <a:schemeClr val="accent1">
+              <a:shade val="50000"/>
+            </a:schemeClr>
+          </a:lnRef>
+          <a:fillRef idx="1">
+            <a:schemeClr val="accent1"/>
+          </a:fillRef>
+          <a:effectRef idx="0">
+            <a:schemeClr val="accent1"/>
+          </a:effectRef>
+          <a:fontRef idx="minor">
+            <a:schemeClr val="lt1"/>
+          </a:fontRef>
+        </p:style>
+        <p:txBody>
+          <a:bodyPr rtlCol="0" anchor="ctr"/>
+          <a:lstStyle/>
+          <a:p>
+            <a:pPr algn="ctr"/>
+            <a:endParaRPr lang="en-LU"/>
+          </a:p>
+        </p:txBody>
+      </p:sp>
+      <p:sp>
+        <p:nvSpPr>
+          <p:cNvPr id="265" name="TextBox 264">
+            <a:extLst>
+              <a:ext uri="{FF2B5EF4-FFF2-40B4-BE49-F238E27FC236}">
+                <a16:creationId xmlns:a16="http://schemas.microsoft.com/office/drawing/2014/main" id="{77F92F1E-1DD0-E047-A5A5-A04026552132}"/>
+              </a:ext>
+            </a:extLst>
+          </p:cNvPr>
+          <p:cNvSpPr txBox="1"/>
+          <p:nvPr/>
+        </p:nvSpPr>
+        <p:spPr>
+          <a:xfrm>
+            <a:off x="2030927" y="1288846"/>
+            <a:ext cx="467882" cy="184666"/>
+          </a:xfrm>
+          <a:prstGeom prst="rect">
+            <a:avLst/>
+          </a:prstGeom>
+          <a:noFill/>
+        </p:spPr>
+        <p:txBody>
+          <a:bodyPr wrap="square" rtlCol="0">
+            <a:spAutoFit/>
+          </a:bodyPr>
+          <a:lstStyle/>
+          <a:p>
+            <a:r>
+              <a:rPr lang="en-LU" sz="600" dirty="0">
+                <a:latin typeface="Arial" panose="020B0604020202020204" pitchFamily="34" charset="0"/>
+                <a:cs typeface="Arial" panose="020B0604020202020204" pitchFamily="34" charset="0"/>
+              </a:rPr>
+              <a:t>Execute</a:t>
+            </a:r>
+          </a:p>
+        </p:txBody>
+      </p:sp>
+      <p:sp>
+        <p:nvSpPr>
+          <p:cNvPr id="266" name="TextBox 265">
+            <a:extLst>
+              <a:ext uri="{FF2B5EF4-FFF2-40B4-BE49-F238E27FC236}">
+                <a16:creationId xmlns:a16="http://schemas.microsoft.com/office/drawing/2014/main" id="{11BB5BE5-7324-7740-B993-C0A6ED77B3D7}"/>
+              </a:ext>
+            </a:extLst>
+          </p:cNvPr>
+          <p:cNvSpPr txBox="1"/>
+          <p:nvPr/>
+        </p:nvSpPr>
+        <p:spPr>
+          <a:xfrm>
+            <a:off x="762600" y="1278805"/>
+            <a:ext cx="521297" cy="276999"/>
+          </a:xfrm>
+          <a:prstGeom prst="rect">
+            <a:avLst/>
+          </a:prstGeom>
+          <a:noFill/>
+        </p:spPr>
+        <p:txBody>
+          <a:bodyPr wrap="square" rtlCol="0">
+            <a:spAutoFit/>
+          </a:bodyPr>
+          <a:lstStyle/>
+          <a:p>
+            <a:pPr algn="ctr"/>
+            <a:r>
+              <a:rPr lang="en-LU" sz="600" dirty="0">
+                <a:latin typeface="Arial" panose="020B0604020202020204" pitchFamily="34" charset="0"/>
+                <a:cs typeface="Arial" panose="020B0604020202020204" pitchFamily="34" charset="0"/>
+              </a:rPr>
+              <a:t>FM</a:t>
+            </a:r>
+          </a:p>
+          <a:p>
+            <a:pPr algn="ctr"/>
+            <a:r>
+              <a:rPr lang="en-LU" sz="600" dirty="0">
+                <a:latin typeface="Arial" panose="020B0604020202020204" pitchFamily="34" charset="0"/>
+                <a:cs typeface="Arial" panose="020B0604020202020204" pitchFamily="34" charset="0"/>
+              </a:rPr>
+              <a:t>Coverage</a:t>
+            </a:r>
+          </a:p>
+        </p:txBody>
+      </p:sp>
+      <p:sp>
+        <p:nvSpPr>
+          <p:cNvPr id="267" name="Parallelogram 266">
+            <a:extLst>
+              <a:ext uri="{FF2B5EF4-FFF2-40B4-BE49-F238E27FC236}">
+                <a16:creationId xmlns:a16="http://schemas.microsoft.com/office/drawing/2014/main" id="{C674116C-8100-0D45-A1D3-2DDDD6E922EE}"/>
+              </a:ext>
+            </a:extLst>
+          </p:cNvPr>
+          <p:cNvSpPr/>
+          <p:nvPr/>
+        </p:nvSpPr>
+        <p:spPr>
+          <a:xfrm>
+            <a:off x="808780" y="1302887"/>
+            <a:ext cx="446760" cy="202169"/>
+          </a:xfrm>
+          <a:prstGeom prst="parallelogram">
+            <a:avLst/>
+          </a:prstGeom>
+          <a:noFill/>
+          <a:ln>
+            <a:solidFill>
+              <a:schemeClr val="tx1">
+                <a:lumMod val="50000"/>
+              </a:schemeClr>
+            </a:solidFill>
+          </a:ln>
+        </p:spPr>
+        <p:style>
+          <a:lnRef idx="2">
+            <a:schemeClr val="accent1">
+              <a:shade val="50000"/>
+            </a:schemeClr>
+          </a:lnRef>
+          <a:fillRef idx="1">
+            <a:schemeClr val="accent1"/>
+          </a:fillRef>
+          <a:effectRef idx="0">
+            <a:schemeClr val="accent1"/>
+          </a:effectRef>
+          <a:fontRef idx="minor">
+            <a:schemeClr val="lt1"/>
+          </a:fontRef>
+        </p:style>
+        <p:txBody>
+          <a:bodyPr rtlCol="0" anchor="ctr"/>
+          <a:lstStyle/>
+          <a:p>
+            <a:pPr algn="ctr"/>
+            <a:endParaRPr lang="en-LU"/>
+          </a:p>
+        </p:txBody>
+      </p:sp>
+      <p:cxnSp>
+        <p:nvCxnSpPr>
+          <p:cNvPr id="268" name="Straight Arrow Connector 267">
+            <a:extLst>
+              <a:ext uri="{FF2B5EF4-FFF2-40B4-BE49-F238E27FC236}">
+                <a16:creationId xmlns:a16="http://schemas.microsoft.com/office/drawing/2014/main" id="{E80B5BA8-5DEF-0744-B281-063724D31D37}"/>
+              </a:ext>
+            </a:extLst>
+          </p:cNvPr>
+          <p:cNvCxnSpPr>
+            <a:cxnSpLocks/>
+            <a:stCxn id="253" idx="5"/>
+          </p:cNvCxnSpPr>
+          <p:nvPr/>
+        </p:nvCxnSpPr>
+        <p:spPr>
+          <a:xfrm flipH="1">
+            <a:off x="1198811" y="1883418"/>
+            <a:ext cx="201686" cy="203882"/>
+          </a:xfrm>
+          <a:prstGeom prst="straightConnector1">
+            <a:avLst/>
+          </a:prstGeom>
+          <a:ln w="28575">
+            <a:solidFill>
+              <a:schemeClr val="tx1"/>
+            </a:solidFill>
+            <a:tailEnd type="triangle"/>
+          </a:ln>
+        </p:spPr>
+        <p:style>
+          <a:lnRef idx="1">
+            <a:schemeClr val="accent1"/>
+          </a:lnRef>
+          <a:fillRef idx="0">
+            <a:schemeClr val="accent1"/>
+          </a:fillRef>
+          <a:effectRef idx="0">
+            <a:schemeClr val="accent1"/>
+          </a:effectRef>
+          <a:fontRef idx="minor">
+            <a:schemeClr val="tx1"/>
+          </a:fontRef>
+        </p:style>
+      </p:cxnSp>
+      <p:cxnSp>
+        <p:nvCxnSpPr>
+          <p:cNvPr id="269" name="Straight Arrow Connector 268">
+            <a:extLst>
+              <a:ext uri="{FF2B5EF4-FFF2-40B4-BE49-F238E27FC236}">
+                <a16:creationId xmlns:a16="http://schemas.microsoft.com/office/drawing/2014/main" id="{7224B6D3-205D-0B48-89E4-597730F6DC47}"/>
+              </a:ext>
+            </a:extLst>
+          </p:cNvPr>
+          <p:cNvCxnSpPr>
+            <a:cxnSpLocks/>
+          </p:cNvCxnSpPr>
+          <p:nvPr/>
+        </p:nvCxnSpPr>
+        <p:spPr>
+          <a:xfrm flipH="1">
+            <a:off x="2323850" y="1468222"/>
+            <a:ext cx="318092" cy="355943"/>
+          </a:xfrm>
+          <a:prstGeom prst="straightConnector1">
+            <a:avLst/>
+          </a:prstGeom>
+          <a:ln w="28575">
+            <a:solidFill>
+              <a:schemeClr val="tx1"/>
+            </a:solidFill>
+            <a:tailEnd type="triangle"/>
+          </a:ln>
+        </p:spPr>
+        <p:style>
+          <a:lnRef idx="1">
+            <a:schemeClr val="accent1"/>
+          </a:lnRef>
+          <a:fillRef idx="0">
+            <a:schemeClr val="accent1"/>
+          </a:fillRef>
+          <a:effectRef idx="0">
+            <a:schemeClr val="accent1"/>
+          </a:effectRef>
+          <a:fontRef idx="minor">
+            <a:schemeClr val="tx1"/>
+          </a:fontRef>
+        </p:style>
+      </p:cxnSp>
+      <p:cxnSp>
+        <p:nvCxnSpPr>
+          <p:cNvPr id="270" name="Straight Arrow Connector 269">
+            <a:extLst>
+              <a:ext uri="{FF2B5EF4-FFF2-40B4-BE49-F238E27FC236}">
+                <a16:creationId xmlns:a16="http://schemas.microsoft.com/office/drawing/2014/main" id="{7752253D-E44D-534B-943C-37C27C42BD85}"/>
+              </a:ext>
+            </a:extLst>
+          </p:cNvPr>
+          <p:cNvCxnSpPr>
+            <a:cxnSpLocks/>
+          </p:cNvCxnSpPr>
+          <p:nvPr/>
+        </p:nvCxnSpPr>
+        <p:spPr>
+          <a:xfrm flipV="1">
+            <a:off x="1875306" y="486202"/>
+            <a:ext cx="219617" cy="108295"/>
+          </a:xfrm>
+          <a:prstGeom prst="straightConnector1">
+            <a:avLst/>
+          </a:prstGeom>
+          <a:ln w="12700">
+            <a:solidFill>
+              <a:schemeClr val="tx1"/>
+            </a:solidFill>
+            <a:prstDash val="sysDash"/>
+            <a:tailEnd type="triangle"/>
+          </a:ln>
+        </p:spPr>
+        <p:style>
+          <a:lnRef idx="1">
+            <a:schemeClr val="accent1"/>
+          </a:lnRef>
+          <a:fillRef idx="0">
+            <a:schemeClr val="accent1"/>
+          </a:fillRef>
+          <a:effectRef idx="0">
+            <a:schemeClr val="accent1"/>
+          </a:effectRef>
+          <a:fontRef idx="minor">
+            <a:schemeClr val="tx1"/>
+          </a:fontRef>
+        </p:style>
+      </p:cxnSp>
+      <p:sp>
+        <p:nvSpPr>
+          <p:cNvPr id="271" name="Rectangle 270">
+            <a:extLst>
+              <a:ext uri="{FF2B5EF4-FFF2-40B4-BE49-F238E27FC236}">
+                <a16:creationId xmlns:a16="http://schemas.microsoft.com/office/drawing/2014/main" id="{C1C82507-914C-BA44-A696-DF8D011A5D0B}"/>
+              </a:ext>
+            </a:extLst>
+          </p:cNvPr>
+          <p:cNvSpPr/>
+          <p:nvPr/>
+        </p:nvSpPr>
+        <p:spPr>
+          <a:xfrm>
+            <a:off x="1861648" y="502164"/>
+            <a:ext cx="489236" cy="184666"/>
+          </a:xfrm>
+          <a:prstGeom prst="rect">
+            <a:avLst/>
+          </a:prstGeom>
+        </p:spPr>
+        <p:txBody>
+          <a:bodyPr wrap="none">
+            <a:spAutoFit/>
+          </a:bodyPr>
+          <a:lstStyle/>
+          <a:p>
+            <a:r>
+              <a:rPr lang="en-LU" sz="600" dirty="0">
+                <a:latin typeface="Arial" panose="020B0604020202020204" pitchFamily="34" charset="0"/>
+                <a:cs typeface="Arial" panose="020B0604020202020204" pitchFamily="34" charset="0"/>
+              </a:rPr>
+              <a:t>&lt;&lt;use&gt;&gt;</a:t>
+            </a:r>
+            <a:endParaRPr lang="en-LU" sz="1400" dirty="0"/>
+          </a:p>
+        </p:txBody>
+      </p:sp>
+      <p:sp>
+        <p:nvSpPr>
+          <p:cNvPr id="272" name="Rounded Rectangle 271">
+            <a:extLst>
+              <a:ext uri="{FF2B5EF4-FFF2-40B4-BE49-F238E27FC236}">
+                <a16:creationId xmlns:a16="http://schemas.microsoft.com/office/drawing/2014/main" id="{69AA37B5-D1F5-2846-AB03-14BC52497288}"/>
+              </a:ext>
+            </a:extLst>
+          </p:cNvPr>
+          <p:cNvSpPr/>
+          <p:nvPr/>
+        </p:nvSpPr>
+        <p:spPr>
+          <a:xfrm>
+            <a:off x="42391" y="1126574"/>
+            <a:ext cx="528390" cy="524084"/>
+          </a:xfrm>
+          <a:prstGeom prst="roundRect">
+            <a:avLst/>
+          </a:prstGeom>
+          <a:noFill/>
+          <a:ln>
+            <a:solidFill>
+              <a:schemeClr val="tx1">
+                <a:lumMod val="50000"/>
+              </a:schemeClr>
+            </a:solidFill>
+          </a:ln>
+        </p:spPr>
+        <p:style>
+          <a:lnRef idx="2">
+            <a:schemeClr val="accent1">
+              <a:shade val="50000"/>
+            </a:schemeClr>
+          </a:lnRef>
+          <a:fillRef idx="1">
+            <a:schemeClr val="accent1"/>
+          </a:fillRef>
+          <a:effectRef idx="0">
+            <a:schemeClr val="accent1"/>
+          </a:effectRef>
+          <a:fontRef idx="minor">
+            <a:schemeClr val="lt1"/>
+          </a:fontRef>
+        </p:style>
+        <p:txBody>
+          <a:bodyPr rtlCol="0" anchor="ctr"/>
+          <a:lstStyle/>
+          <a:p>
+            <a:pPr algn="ctr"/>
+            <a:endParaRPr lang="en-LU"/>
+          </a:p>
+        </p:txBody>
+      </p:sp>
+      <p:sp>
+        <p:nvSpPr>
+          <p:cNvPr id="273" name="TextBox 272">
+            <a:extLst>
+              <a:ext uri="{FF2B5EF4-FFF2-40B4-BE49-F238E27FC236}">
+                <a16:creationId xmlns:a16="http://schemas.microsoft.com/office/drawing/2014/main" id="{B5A22678-2F50-774C-8F97-1CC5E2D44649}"/>
+              </a:ext>
+            </a:extLst>
+          </p:cNvPr>
+          <p:cNvSpPr txBox="1"/>
+          <p:nvPr/>
+        </p:nvSpPr>
+        <p:spPr>
+          <a:xfrm>
+            <a:off x="21464" y="1740356"/>
+            <a:ext cx="521297" cy="276999"/>
+          </a:xfrm>
+          <a:prstGeom prst="rect">
+            <a:avLst/>
+          </a:prstGeom>
+          <a:noFill/>
+        </p:spPr>
+        <p:txBody>
+          <a:bodyPr wrap="none" rtlCol="0">
+            <a:spAutoFit/>
+          </a:bodyPr>
+          <a:lstStyle/>
+          <a:p>
+            <a:pPr algn="ctr"/>
+            <a:r>
+              <a:rPr lang="en-LU" sz="600" dirty="0">
+                <a:latin typeface="Arial" panose="020B0604020202020204" pitchFamily="34" charset="0"/>
+                <a:cs typeface="Arial" panose="020B0604020202020204" pitchFamily="34" charset="0"/>
+              </a:rPr>
+              <a:t>FM</a:t>
+            </a:r>
+          </a:p>
+          <a:p>
+            <a:pPr algn="ctr"/>
+            <a:r>
+              <a:rPr lang="en-LU" sz="600" dirty="0">
+                <a:latin typeface="Arial" panose="020B0604020202020204" pitchFamily="34" charset="0"/>
+                <a:cs typeface="Arial" panose="020B0604020202020204" pitchFamily="34" charset="0"/>
+              </a:rPr>
+              <a:t>Coverage</a:t>
+            </a:r>
+          </a:p>
+        </p:txBody>
+      </p:sp>
+      <p:sp>
+        <p:nvSpPr>
+          <p:cNvPr id="274" name="Parallelogram 273">
+            <a:extLst>
+              <a:ext uri="{FF2B5EF4-FFF2-40B4-BE49-F238E27FC236}">
+                <a16:creationId xmlns:a16="http://schemas.microsoft.com/office/drawing/2014/main" id="{3375709C-4D6B-A241-B0ED-EA99AEF459D7}"/>
+              </a:ext>
+            </a:extLst>
+          </p:cNvPr>
+          <p:cNvSpPr/>
+          <p:nvPr/>
+        </p:nvSpPr>
+        <p:spPr>
+          <a:xfrm>
+            <a:off x="74360" y="1777773"/>
+            <a:ext cx="446760" cy="207316"/>
+          </a:xfrm>
+          <a:prstGeom prst="parallelogram">
+            <a:avLst>
+              <a:gd name="adj" fmla="val 25113"/>
+            </a:avLst>
+          </a:prstGeom>
+          <a:noFill/>
+          <a:ln>
+            <a:solidFill>
+              <a:schemeClr val="tx1">
+                <a:lumMod val="50000"/>
+              </a:schemeClr>
+            </a:solidFill>
+          </a:ln>
+        </p:spPr>
+        <p:style>
+          <a:lnRef idx="2">
+            <a:schemeClr val="accent1">
+              <a:shade val="50000"/>
+            </a:schemeClr>
+          </a:lnRef>
+          <a:fillRef idx="1">
+            <a:schemeClr val="accent1"/>
+          </a:fillRef>
+          <a:effectRef idx="0">
+            <a:schemeClr val="accent1"/>
+          </a:effectRef>
+          <a:fontRef idx="minor">
+            <a:schemeClr val="lt1"/>
+          </a:fontRef>
+        </p:style>
+        <p:txBody>
+          <a:bodyPr rtlCol="0" anchor="ctr"/>
+          <a:lstStyle/>
+          <a:p>
+            <a:pPr algn="ctr"/>
+            <a:endParaRPr lang="en-LU"/>
+          </a:p>
+        </p:txBody>
+      </p:sp>
+      <p:sp>
+        <p:nvSpPr>
+          <p:cNvPr id="275" name="TextBox 274">
+            <a:extLst>
+              <a:ext uri="{FF2B5EF4-FFF2-40B4-BE49-F238E27FC236}">
+                <a16:creationId xmlns:a16="http://schemas.microsoft.com/office/drawing/2014/main" id="{74824C42-7AF9-514C-94EA-34296B78F0A1}"/>
+              </a:ext>
+            </a:extLst>
+          </p:cNvPr>
+          <p:cNvSpPr txBox="1"/>
+          <p:nvPr/>
+        </p:nvSpPr>
+        <p:spPr>
+          <a:xfrm>
+            <a:off x="-1598" y="1991119"/>
+            <a:ext cx="562976" cy="369332"/>
+          </a:xfrm>
+          <a:prstGeom prst="rect">
+            <a:avLst/>
+          </a:prstGeom>
+          <a:noFill/>
+        </p:spPr>
+        <p:txBody>
+          <a:bodyPr wrap="none" rtlCol="0">
+            <a:spAutoFit/>
+          </a:bodyPr>
+          <a:lstStyle/>
+          <a:p>
+            <a:pPr algn="ctr"/>
+            <a:r>
+              <a:rPr lang="en-LU" sz="600" dirty="0">
+                <a:latin typeface="Arial" panose="020B0604020202020204" pitchFamily="34" charset="0"/>
+                <a:cs typeface="Arial" panose="020B0604020202020204" pitchFamily="34" charset="0"/>
+              </a:rPr>
+              <a:t>Mutation</a:t>
+            </a:r>
+          </a:p>
+          <a:p>
+            <a:pPr algn="ctr"/>
+            <a:r>
+              <a:rPr lang="en-LU" sz="600" dirty="0">
+                <a:latin typeface="Arial" panose="020B0604020202020204" pitchFamily="34" charset="0"/>
+                <a:cs typeface="Arial" panose="020B0604020202020204" pitchFamily="34" charset="0"/>
+              </a:rPr>
+              <a:t>Operations</a:t>
+            </a:r>
+          </a:p>
+          <a:p>
+            <a:pPr algn="ctr"/>
+            <a:r>
+              <a:rPr lang="en-LU" sz="600" dirty="0">
+                <a:latin typeface="Arial" panose="020B0604020202020204" pitchFamily="34" charset="0"/>
+                <a:cs typeface="Arial" panose="020B0604020202020204" pitchFamily="34" charset="0"/>
+              </a:rPr>
+              <a:t>Coverage</a:t>
+            </a:r>
+          </a:p>
+        </p:txBody>
+      </p:sp>
+      <p:sp>
+        <p:nvSpPr>
+          <p:cNvPr id="276" name="Parallelogram 275">
+            <a:extLst>
+              <a:ext uri="{FF2B5EF4-FFF2-40B4-BE49-F238E27FC236}">
+                <a16:creationId xmlns:a16="http://schemas.microsoft.com/office/drawing/2014/main" id="{0BEFA41B-627E-424A-BE74-18914EA6E22B}"/>
+              </a:ext>
+            </a:extLst>
+          </p:cNvPr>
+          <p:cNvSpPr/>
+          <p:nvPr/>
+        </p:nvSpPr>
+        <p:spPr>
+          <a:xfrm>
+            <a:off x="31879" y="2028535"/>
+            <a:ext cx="489241" cy="326416"/>
+          </a:xfrm>
+          <a:prstGeom prst="parallelogram">
+            <a:avLst/>
+          </a:prstGeom>
+          <a:noFill/>
+          <a:ln>
+            <a:solidFill>
+              <a:schemeClr val="tx1">
+                <a:lumMod val="50000"/>
+              </a:schemeClr>
+            </a:solidFill>
+          </a:ln>
+        </p:spPr>
+        <p:style>
+          <a:lnRef idx="2">
+            <a:schemeClr val="accent1">
+              <a:shade val="50000"/>
+            </a:schemeClr>
+          </a:lnRef>
+          <a:fillRef idx="1">
+            <a:schemeClr val="accent1"/>
+          </a:fillRef>
+          <a:effectRef idx="0">
+            <a:schemeClr val="accent1"/>
+          </a:effectRef>
+          <a:fontRef idx="minor">
+            <a:schemeClr val="lt1"/>
+          </a:fontRef>
+        </p:style>
+        <p:txBody>
+          <a:bodyPr rtlCol="0" anchor="ctr"/>
+          <a:lstStyle/>
+          <a:p>
+            <a:pPr algn="ctr"/>
+            <a:endParaRPr lang="en-LU"/>
+          </a:p>
+        </p:txBody>
+      </p:sp>
+      <p:sp>
+        <p:nvSpPr>
+          <p:cNvPr id="277" name="TextBox 276">
+            <a:extLst>
+              <a:ext uri="{FF2B5EF4-FFF2-40B4-BE49-F238E27FC236}">
+                <a16:creationId xmlns:a16="http://schemas.microsoft.com/office/drawing/2014/main" id="{991042A0-78AF-9648-A8FB-BAF18A7BE082}"/>
+              </a:ext>
+            </a:extLst>
+          </p:cNvPr>
+          <p:cNvSpPr txBox="1"/>
+          <p:nvPr/>
+        </p:nvSpPr>
+        <p:spPr>
+          <a:xfrm>
+            <a:off x="33141" y="2334025"/>
+            <a:ext cx="481221" cy="276999"/>
+          </a:xfrm>
+          <a:prstGeom prst="rect">
+            <a:avLst/>
+          </a:prstGeom>
+          <a:noFill/>
+        </p:spPr>
+        <p:txBody>
+          <a:bodyPr wrap="none" rtlCol="0">
+            <a:spAutoFit/>
+          </a:bodyPr>
+          <a:lstStyle/>
+          <a:p>
+            <a:pPr algn="ctr"/>
+            <a:r>
+              <a:rPr lang="en-LU" sz="600" dirty="0">
+                <a:latin typeface="Arial" panose="020B0604020202020204" pitchFamily="34" charset="0"/>
+                <a:cs typeface="Arial" panose="020B0604020202020204" pitchFamily="34" charset="0"/>
+              </a:rPr>
+              <a:t>Mutation</a:t>
+            </a:r>
+          </a:p>
+          <a:p>
+            <a:pPr algn="ctr"/>
+            <a:r>
+              <a:rPr lang="en-LU" sz="600" dirty="0">
+                <a:latin typeface="Arial" panose="020B0604020202020204" pitchFamily="34" charset="0"/>
+                <a:cs typeface="Arial" panose="020B0604020202020204" pitchFamily="34" charset="0"/>
+              </a:rPr>
+              <a:t>Score</a:t>
+            </a:r>
+          </a:p>
+        </p:txBody>
+      </p:sp>
+      <p:sp>
+        <p:nvSpPr>
+          <p:cNvPr id="278" name="Parallelogram 277">
+            <a:extLst>
+              <a:ext uri="{FF2B5EF4-FFF2-40B4-BE49-F238E27FC236}">
+                <a16:creationId xmlns:a16="http://schemas.microsoft.com/office/drawing/2014/main" id="{FE1E8BA5-83FD-124A-87B9-32CED5C2BB96}"/>
+              </a:ext>
+            </a:extLst>
+          </p:cNvPr>
+          <p:cNvSpPr/>
+          <p:nvPr/>
+        </p:nvSpPr>
+        <p:spPr>
+          <a:xfrm>
+            <a:off x="65999" y="2371441"/>
+            <a:ext cx="446760" cy="202169"/>
+          </a:xfrm>
+          <a:prstGeom prst="parallelogram">
+            <a:avLst/>
+          </a:prstGeom>
+          <a:noFill/>
+          <a:ln>
+            <a:solidFill>
+              <a:schemeClr val="tx1">
+                <a:lumMod val="50000"/>
+              </a:schemeClr>
+            </a:solidFill>
+          </a:ln>
+        </p:spPr>
+        <p:style>
+          <a:lnRef idx="2">
+            <a:schemeClr val="accent1">
+              <a:shade val="50000"/>
+            </a:schemeClr>
+          </a:lnRef>
+          <a:fillRef idx="1">
+            <a:schemeClr val="accent1"/>
+          </a:fillRef>
+          <a:effectRef idx="0">
+            <a:schemeClr val="accent1"/>
+          </a:effectRef>
+          <a:fontRef idx="minor">
+            <a:schemeClr val="lt1"/>
+          </a:fontRef>
+        </p:style>
+        <p:txBody>
+          <a:bodyPr rtlCol="0" anchor="ctr"/>
+          <a:lstStyle/>
+          <a:p>
+            <a:pPr algn="ctr"/>
+            <a:endParaRPr lang="en-LU"/>
+          </a:p>
+        </p:txBody>
+      </p:sp>
+      <p:cxnSp>
+        <p:nvCxnSpPr>
+          <p:cNvPr id="279" name="Straight Arrow Connector 278">
+            <a:extLst>
+              <a:ext uri="{FF2B5EF4-FFF2-40B4-BE49-F238E27FC236}">
+                <a16:creationId xmlns:a16="http://schemas.microsoft.com/office/drawing/2014/main" id="{83470186-EDDC-0549-9C05-65E95CF796A0}"/>
+              </a:ext>
+            </a:extLst>
+          </p:cNvPr>
+          <p:cNvCxnSpPr>
+            <a:cxnSpLocks/>
+          </p:cNvCxnSpPr>
+          <p:nvPr/>
+        </p:nvCxnSpPr>
+        <p:spPr>
+          <a:xfrm flipH="1">
+            <a:off x="552930" y="1393012"/>
+            <a:ext cx="224131" cy="0"/>
+          </a:xfrm>
+          <a:prstGeom prst="straightConnector1">
+            <a:avLst/>
+          </a:prstGeom>
+          <a:ln w="28575">
+            <a:solidFill>
+              <a:schemeClr val="tx1"/>
+            </a:solidFill>
+            <a:tailEnd type="triangle"/>
+          </a:ln>
+        </p:spPr>
+        <p:style>
+          <a:lnRef idx="1">
+            <a:schemeClr val="accent1"/>
+          </a:lnRef>
+          <a:fillRef idx="0">
+            <a:schemeClr val="accent1"/>
+          </a:fillRef>
+          <a:effectRef idx="0">
+            <a:schemeClr val="accent1"/>
+          </a:effectRef>
+          <a:fontRef idx="minor">
+            <a:schemeClr val="tx1"/>
+          </a:fontRef>
+        </p:style>
+      </p:cxnSp>
+      <p:cxnSp>
+        <p:nvCxnSpPr>
+          <p:cNvPr id="280" name="Straight Arrow Connector 279">
+            <a:extLst>
+              <a:ext uri="{FF2B5EF4-FFF2-40B4-BE49-F238E27FC236}">
+                <a16:creationId xmlns:a16="http://schemas.microsoft.com/office/drawing/2014/main" id="{B4214F3B-9D6D-1945-8D40-8973F89B8E17}"/>
+              </a:ext>
+            </a:extLst>
+          </p:cNvPr>
+          <p:cNvCxnSpPr>
+            <a:cxnSpLocks/>
+            <a:endCxn id="259" idx="3"/>
+          </p:cNvCxnSpPr>
+          <p:nvPr/>
+        </p:nvCxnSpPr>
+        <p:spPr>
+          <a:xfrm flipH="1">
+            <a:off x="1205690" y="1874640"/>
+            <a:ext cx="190790" cy="23670"/>
+          </a:xfrm>
+          <a:prstGeom prst="straightConnector1">
+            <a:avLst/>
+          </a:prstGeom>
+          <a:ln w="28575">
+            <a:solidFill>
+              <a:schemeClr val="tx1"/>
+            </a:solidFill>
+            <a:tailEnd type="triangle"/>
+          </a:ln>
+        </p:spPr>
+        <p:style>
+          <a:lnRef idx="1">
+            <a:schemeClr val="accent1"/>
+          </a:lnRef>
+          <a:fillRef idx="0">
+            <a:schemeClr val="accent1"/>
+          </a:fillRef>
+          <a:effectRef idx="0">
+            <a:schemeClr val="accent1"/>
+          </a:effectRef>
+          <a:fontRef idx="minor">
+            <a:schemeClr val="tx1"/>
+          </a:fontRef>
+        </p:style>
+      </p:cxnSp>
+      <p:cxnSp>
+        <p:nvCxnSpPr>
+          <p:cNvPr id="281" name="Straight Arrow Connector 280">
+            <a:extLst>
+              <a:ext uri="{FF2B5EF4-FFF2-40B4-BE49-F238E27FC236}">
+                <a16:creationId xmlns:a16="http://schemas.microsoft.com/office/drawing/2014/main" id="{89577D3E-3AA1-614F-89EB-104455B02C11}"/>
+              </a:ext>
+            </a:extLst>
+          </p:cNvPr>
+          <p:cNvCxnSpPr>
+            <a:cxnSpLocks/>
+          </p:cNvCxnSpPr>
+          <p:nvPr/>
+        </p:nvCxnSpPr>
+        <p:spPr>
+          <a:xfrm>
+            <a:off x="301290" y="1648964"/>
+            <a:ext cx="0" cy="169782"/>
+          </a:xfrm>
+          <a:prstGeom prst="straightConnector1">
+            <a:avLst/>
+          </a:prstGeom>
+          <a:ln w="28575">
+            <a:solidFill>
+              <a:schemeClr val="tx1"/>
+            </a:solidFill>
+            <a:tailEnd type="triangle"/>
+          </a:ln>
+        </p:spPr>
+        <p:style>
+          <a:lnRef idx="1">
+            <a:schemeClr val="accent1"/>
+          </a:lnRef>
+          <a:fillRef idx="0">
+            <a:schemeClr val="accent1"/>
+          </a:fillRef>
+          <a:effectRef idx="0">
+            <a:schemeClr val="accent1"/>
+          </a:effectRef>
+          <a:fontRef idx="minor">
+            <a:schemeClr val="tx1"/>
+          </a:fontRef>
+        </p:style>
+      </p:cxnSp>
+      <p:sp>
+        <p:nvSpPr>
+          <p:cNvPr id="282" name="TextBox 281">
+            <a:extLst>
+              <a:ext uri="{FF2B5EF4-FFF2-40B4-BE49-F238E27FC236}">
+                <a16:creationId xmlns:a16="http://schemas.microsoft.com/office/drawing/2014/main" id="{69977EA2-27BB-0543-A30D-1E08FA0FB2EE}"/>
+              </a:ext>
+            </a:extLst>
+          </p:cNvPr>
+          <p:cNvSpPr txBox="1"/>
+          <p:nvPr/>
+        </p:nvSpPr>
+        <p:spPr>
+          <a:xfrm>
+            <a:off x="2527221" y="1227934"/>
+            <a:ext cx="511818" cy="276999"/>
+          </a:xfrm>
+          <a:prstGeom prst="rect">
+            <a:avLst/>
+          </a:prstGeom>
+          <a:noFill/>
+        </p:spPr>
+        <p:txBody>
+          <a:bodyPr wrap="square" rtlCol="0">
+            <a:spAutoFit/>
+          </a:bodyPr>
+          <a:lstStyle/>
+          <a:p>
+            <a:pPr algn="ctr"/>
+            <a:r>
+              <a:rPr lang="en-LU" sz="600" dirty="0">
+                <a:latin typeface="Arial" panose="020B0604020202020204" pitchFamily="34" charset="0"/>
+                <a:cs typeface="Arial" panose="020B0604020202020204" pitchFamily="34" charset="0"/>
+              </a:rPr>
+              <a:t>SUT Test</a:t>
+            </a:r>
+          </a:p>
+          <a:p>
+            <a:pPr algn="ctr"/>
+            <a:r>
+              <a:rPr lang="en-LU" sz="600" dirty="0">
+                <a:latin typeface="Arial" panose="020B0604020202020204" pitchFamily="34" charset="0"/>
+                <a:cs typeface="Arial" panose="020B0604020202020204" pitchFamily="34" charset="0"/>
+              </a:rPr>
+              <a:t>Suite</a:t>
+            </a:r>
+          </a:p>
+        </p:txBody>
+      </p:sp>
+      <p:sp>
+        <p:nvSpPr>
+          <p:cNvPr id="283" name="Parallelogram 282">
+            <a:extLst>
+              <a:ext uri="{FF2B5EF4-FFF2-40B4-BE49-F238E27FC236}">
+                <a16:creationId xmlns:a16="http://schemas.microsoft.com/office/drawing/2014/main" id="{0E878C6F-1162-6A45-88C9-B28632B6F3DD}"/>
+              </a:ext>
+            </a:extLst>
+          </p:cNvPr>
+          <p:cNvSpPr/>
+          <p:nvPr/>
+        </p:nvSpPr>
+        <p:spPr>
+          <a:xfrm>
+            <a:off x="2579965" y="1245105"/>
+            <a:ext cx="413580" cy="232596"/>
+          </a:xfrm>
+          <a:prstGeom prst="parallelogram">
+            <a:avLst>
+              <a:gd name="adj" fmla="val 12062"/>
+            </a:avLst>
+          </a:prstGeom>
+          <a:noFill/>
+          <a:ln>
+            <a:solidFill>
+              <a:schemeClr val="tx1">
+                <a:lumMod val="50000"/>
+              </a:schemeClr>
+            </a:solidFill>
+          </a:ln>
+        </p:spPr>
+        <p:style>
+          <a:lnRef idx="2">
+            <a:schemeClr val="accent1">
+              <a:shade val="50000"/>
+            </a:schemeClr>
+          </a:lnRef>
+          <a:fillRef idx="1">
+            <a:schemeClr val="accent1"/>
+          </a:fillRef>
+          <a:effectRef idx="0">
+            <a:schemeClr val="accent1"/>
+          </a:effectRef>
+          <a:fontRef idx="minor">
+            <a:schemeClr val="lt1"/>
+          </a:fontRef>
+        </p:style>
+        <p:txBody>
+          <a:bodyPr rtlCol="0" anchor="ctr"/>
+          <a:lstStyle/>
+          <a:p>
+            <a:pPr algn="ctr"/>
+            <a:endParaRPr lang="en-LU"/>
+          </a:p>
+        </p:txBody>
+      </p:sp>
+      <p:sp>
+        <p:nvSpPr>
+          <p:cNvPr id="284" name="TextBox 283">
+            <a:extLst>
+              <a:ext uri="{FF2B5EF4-FFF2-40B4-BE49-F238E27FC236}">
+                <a16:creationId xmlns:a16="http://schemas.microsoft.com/office/drawing/2014/main" id="{F6ECC1E4-DDE4-A04B-B9CE-2F6727DDE4E6}"/>
+              </a:ext>
+            </a:extLst>
+          </p:cNvPr>
+          <p:cNvSpPr txBox="1"/>
+          <p:nvPr/>
+        </p:nvSpPr>
+        <p:spPr>
+          <a:xfrm>
+            <a:off x="910837" y="2541720"/>
+            <a:ext cx="526106" cy="184666"/>
+          </a:xfrm>
+          <a:prstGeom prst="rect">
+            <a:avLst/>
+          </a:prstGeom>
+          <a:noFill/>
+        </p:spPr>
+        <p:txBody>
+          <a:bodyPr wrap="none" rtlCol="0">
+            <a:spAutoFit/>
+          </a:bodyPr>
+          <a:lstStyle/>
+          <a:p>
+            <a:pPr algn="ctr"/>
+            <a:r>
+              <a:rPr lang="en-LU" sz="600" dirty="0">
+                <a:latin typeface="Arial" panose="020B0604020202020204" pitchFamily="34" charset="0"/>
+                <a:cs typeface="Arial" panose="020B0604020202020204" pitchFamily="34" charset="0"/>
+              </a:rPr>
+              <a:t>Data flow</a:t>
+            </a:r>
+          </a:p>
+        </p:txBody>
+      </p:sp>
+      <p:sp>
+        <p:nvSpPr>
+          <p:cNvPr id="285" name="TextBox 284">
+            <a:extLst>
+              <a:ext uri="{FF2B5EF4-FFF2-40B4-BE49-F238E27FC236}">
+                <a16:creationId xmlns:a16="http://schemas.microsoft.com/office/drawing/2014/main" id="{EA160818-AC89-3D4D-922C-EFA8C7F2CFE0}"/>
+              </a:ext>
+            </a:extLst>
+          </p:cNvPr>
+          <p:cNvSpPr txBox="1"/>
+          <p:nvPr/>
+        </p:nvSpPr>
+        <p:spPr>
+          <a:xfrm>
+            <a:off x="1596287" y="2534342"/>
+            <a:ext cx="724878" cy="184666"/>
+          </a:xfrm>
+          <a:prstGeom prst="rect">
+            <a:avLst/>
+          </a:prstGeom>
+          <a:noFill/>
+        </p:spPr>
+        <p:txBody>
+          <a:bodyPr wrap="none" rtlCol="0">
+            <a:spAutoFit/>
+          </a:bodyPr>
+          <a:lstStyle/>
+          <a:p>
+            <a:pPr algn="ctr"/>
+            <a:r>
+              <a:rPr lang="en-LU" sz="600" dirty="0">
+                <a:latin typeface="Arial" panose="020B0604020202020204" pitchFamily="34" charset="0"/>
+                <a:cs typeface="Arial" panose="020B0604020202020204" pitchFamily="34" charset="0"/>
+              </a:rPr>
+              <a:t>Automated step</a:t>
+            </a:r>
+          </a:p>
+        </p:txBody>
+      </p:sp>
+      <p:sp>
+        <p:nvSpPr>
+          <p:cNvPr id="286" name="Rounded Rectangle 285">
+            <a:extLst>
+              <a:ext uri="{FF2B5EF4-FFF2-40B4-BE49-F238E27FC236}">
+                <a16:creationId xmlns:a16="http://schemas.microsoft.com/office/drawing/2014/main" id="{53AB6CA7-9BFE-AA48-8030-36A5A8AA0C1F}"/>
+              </a:ext>
+            </a:extLst>
+          </p:cNvPr>
+          <p:cNvSpPr/>
+          <p:nvPr/>
+        </p:nvSpPr>
+        <p:spPr>
+          <a:xfrm>
+            <a:off x="1415272" y="2568756"/>
+            <a:ext cx="250678" cy="109471"/>
+          </a:xfrm>
+          <a:prstGeom prst="roundRect">
+            <a:avLst/>
+          </a:prstGeom>
+          <a:noFill/>
+          <a:ln>
+            <a:solidFill>
+              <a:schemeClr val="tx1">
+                <a:lumMod val="50000"/>
+              </a:schemeClr>
+            </a:solidFill>
+          </a:ln>
+        </p:spPr>
+        <p:style>
+          <a:lnRef idx="2">
+            <a:schemeClr val="accent1">
+              <a:shade val="50000"/>
+            </a:schemeClr>
+          </a:lnRef>
+          <a:fillRef idx="1">
+            <a:schemeClr val="accent1"/>
+          </a:fillRef>
+          <a:effectRef idx="0">
+            <a:schemeClr val="accent1"/>
+          </a:effectRef>
+          <a:fontRef idx="minor">
+            <a:schemeClr val="lt1"/>
+          </a:fontRef>
+        </p:style>
+        <p:txBody>
+          <a:bodyPr rtlCol="0" anchor="ctr"/>
+          <a:lstStyle/>
+          <a:p>
+            <a:pPr algn="ctr"/>
+            <a:endParaRPr lang="en-LU"/>
+          </a:p>
+        </p:txBody>
+      </p:sp>
+      <p:sp>
+        <p:nvSpPr>
+          <p:cNvPr id="287" name="TextBox 286">
+            <a:extLst>
+              <a:ext uri="{FF2B5EF4-FFF2-40B4-BE49-F238E27FC236}">
+                <a16:creationId xmlns:a16="http://schemas.microsoft.com/office/drawing/2014/main" id="{2193E803-731C-124E-B3D1-2B36283ABB7C}"/>
+              </a:ext>
+            </a:extLst>
+          </p:cNvPr>
+          <p:cNvSpPr txBox="1"/>
+          <p:nvPr/>
+        </p:nvSpPr>
+        <p:spPr>
+          <a:xfrm>
+            <a:off x="2463420" y="2534567"/>
+            <a:ext cx="606256" cy="184666"/>
+          </a:xfrm>
+          <a:prstGeom prst="rect">
+            <a:avLst/>
+          </a:prstGeom>
+          <a:noFill/>
+        </p:spPr>
+        <p:txBody>
+          <a:bodyPr wrap="none" rtlCol="0">
+            <a:spAutoFit/>
+          </a:bodyPr>
+          <a:lstStyle/>
+          <a:p>
+            <a:pPr algn="ctr"/>
+            <a:r>
+              <a:rPr lang="en-LU" sz="600" dirty="0">
+                <a:latin typeface="Arial" panose="020B0604020202020204" pitchFamily="34" charset="0"/>
+                <a:cs typeface="Arial" panose="020B0604020202020204" pitchFamily="34" charset="0"/>
+              </a:rPr>
+              <a:t>Manual step</a:t>
+            </a:r>
+          </a:p>
+        </p:txBody>
+      </p:sp>
+      <p:sp>
+        <p:nvSpPr>
+          <p:cNvPr id="288" name="Rounded Rectangle 287">
+            <a:extLst>
+              <a:ext uri="{FF2B5EF4-FFF2-40B4-BE49-F238E27FC236}">
+                <a16:creationId xmlns:a16="http://schemas.microsoft.com/office/drawing/2014/main" id="{00DC7EC0-8FA5-6C40-9936-2D99D91DFF27}"/>
+              </a:ext>
+            </a:extLst>
+          </p:cNvPr>
+          <p:cNvSpPr/>
+          <p:nvPr/>
+        </p:nvSpPr>
+        <p:spPr>
+          <a:xfrm>
+            <a:off x="2274399" y="2568756"/>
+            <a:ext cx="250678" cy="109471"/>
+          </a:xfrm>
+          <a:prstGeom prst="roundRect">
+            <a:avLst/>
+          </a:prstGeom>
+          <a:noFill/>
+          <a:ln>
+            <a:solidFill>
+              <a:schemeClr val="tx1">
+                <a:lumMod val="50000"/>
+              </a:schemeClr>
+            </a:solidFill>
+            <a:prstDash val="sysDot"/>
+          </a:ln>
+        </p:spPr>
+        <p:style>
+          <a:lnRef idx="2">
+            <a:schemeClr val="accent1">
+              <a:shade val="50000"/>
+            </a:schemeClr>
+          </a:lnRef>
+          <a:fillRef idx="1">
+            <a:schemeClr val="accent1"/>
+          </a:fillRef>
+          <a:effectRef idx="0">
+            <a:schemeClr val="accent1"/>
+          </a:effectRef>
+          <a:fontRef idx="minor">
+            <a:schemeClr val="lt1"/>
+          </a:fontRef>
+        </p:style>
+        <p:txBody>
+          <a:bodyPr rtlCol="0" anchor="ctr"/>
+          <a:lstStyle/>
+          <a:p>
+            <a:pPr algn="ctr"/>
+            <a:endParaRPr lang="en-LU"/>
+          </a:p>
+        </p:txBody>
+      </p:sp>
+      <p:cxnSp>
+        <p:nvCxnSpPr>
+          <p:cNvPr id="289" name="Straight Arrow Connector 288">
+            <a:extLst>
+              <a:ext uri="{FF2B5EF4-FFF2-40B4-BE49-F238E27FC236}">
+                <a16:creationId xmlns:a16="http://schemas.microsoft.com/office/drawing/2014/main" id="{AB35E79F-1001-0A4E-A299-7BD8F2650A68}"/>
+              </a:ext>
+            </a:extLst>
+          </p:cNvPr>
+          <p:cNvCxnSpPr>
+            <a:cxnSpLocks/>
+          </p:cNvCxnSpPr>
+          <p:nvPr/>
+        </p:nvCxnSpPr>
+        <p:spPr>
+          <a:xfrm>
+            <a:off x="751820" y="2628867"/>
+            <a:ext cx="226413" cy="0"/>
+          </a:xfrm>
+          <a:prstGeom prst="straightConnector1">
+            <a:avLst/>
+          </a:prstGeom>
+          <a:ln w="28575">
+            <a:solidFill>
+              <a:schemeClr val="tx1"/>
+            </a:solidFill>
+            <a:tailEnd type="triangle"/>
+          </a:ln>
+        </p:spPr>
+        <p:style>
+          <a:lnRef idx="1">
+            <a:schemeClr val="accent1"/>
+          </a:lnRef>
+          <a:fillRef idx="0">
+            <a:schemeClr val="accent1"/>
+          </a:fillRef>
+          <a:effectRef idx="0">
+            <a:schemeClr val="accent1"/>
+          </a:effectRef>
+          <a:fontRef idx="minor">
+            <a:schemeClr val="tx1"/>
+          </a:fontRef>
+        </p:style>
+      </p:cxnSp>
+      <p:sp>
+        <p:nvSpPr>
+          <p:cNvPr id="290" name="TextBox 289">
+            <a:extLst>
+              <a:ext uri="{FF2B5EF4-FFF2-40B4-BE49-F238E27FC236}">
+                <a16:creationId xmlns:a16="http://schemas.microsoft.com/office/drawing/2014/main" id="{DD33BEAF-26F8-074B-9278-634D3C2F716E}"/>
+              </a:ext>
+            </a:extLst>
+          </p:cNvPr>
+          <p:cNvSpPr txBox="1"/>
+          <p:nvPr/>
+        </p:nvSpPr>
+        <p:spPr>
+          <a:xfrm>
+            <a:off x="623188" y="2424270"/>
+            <a:ext cx="482825" cy="184666"/>
+          </a:xfrm>
+          <a:prstGeom prst="rect">
+            <a:avLst/>
+          </a:prstGeom>
+          <a:noFill/>
+        </p:spPr>
+        <p:txBody>
+          <a:bodyPr wrap="none" rtlCol="0">
+            <a:spAutoFit/>
+          </a:bodyPr>
+          <a:lstStyle/>
+          <a:p>
+            <a:pPr algn="ctr"/>
+            <a:r>
+              <a:rPr lang="en-LU" sz="600" b="1" dirty="0">
+                <a:latin typeface="Arial" panose="020B0604020202020204" pitchFamily="34" charset="0"/>
+                <a:cs typeface="Arial" panose="020B0604020202020204" pitchFamily="34" charset="0"/>
+              </a:rPr>
+              <a:t>Legend:</a:t>
+            </a:r>
+          </a:p>
+        </p:txBody>
+      </p:sp>
+      <p:cxnSp>
+        <p:nvCxnSpPr>
+          <p:cNvPr id="291" name="Straight Arrow Connector 290">
+            <a:extLst>
+              <a:ext uri="{FF2B5EF4-FFF2-40B4-BE49-F238E27FC236}">
+                <a16:creationId xmlns:a16="http://schemas.microsoft.com/office/drawing/2014/main" id="{E6EDBF5A-5044-374E-BA3E-81CC5325E2E5}"/>
+              </a:ext>
+            </a:extLst>
+          </p:cNvPr>
+          <p:cNvCxnSpPr>
+            <a:cxnSpLocks/>
+          </p:cNvCxnSpPr>
+          <p:nvPr/>
+        </p:nvCxnSpPr>
+        <p:spPr>
+          <a:xfrm flipH="1">
+            <a:off x="2373870" y="1379471"/>
+            <a:ext cx="225310" cy="0"/>
+          </a:xfrm>
+          <a:prstGeom prst="straightConnector1">
+            <a:avLst/>
+          </a:prstGeom>
+          <a:ln w="28575">
+            <a:solidFill>
+              <a:schemeClr val="tx1"/>
+            </a:solidFill>
+            <a:tailEnd type="triangle"/>
+          </a:ln>
+        </p:spPr>
+        <p:style>
+          <a:lnRef idx="1">
+            <a:schemeClr val="accent1"/>
+          </a:lnRef>
+          <a:fillRef idx="0">
+            <a:schemeClr val="accent1"/>
+          </a:fillRef>
+          <a:effectRef idx="0">
+            <a:schemeClr val="accent1"/>
+          </a:effectRef>
+          <a:fontRef idx="minor">
+            <a:schemeClr val="tx1"/>
+          </a:fontRef>
+        </p:style>
+      </p:cxnSp>
+      <p:cxnSp>
+        <p:nvCxnSpPr>
+          <p:cNvPr id="79" name="Straight Arrow Connector 78">
+            <a:extLst>
+              <a:ext uri="{FF2B5EF4-FFF2-40B4-BE49-F238E27FC236}">
+                <a16:creationId xmlns:a16="http://schemas.microsoft.com/office/drawing/2014/main" id="{FEE2E780-E07B-8F47-B0AE-88B31C0835B9}"/>
+              </a:ext>
+            </a:extLst>
+          </p:cNvPr>
+          <p:cNvCxnSpPr>
+            <a:cxnSpLocks/>
+            <a:stCxn id="259" idx="1"/>
+          </p:cNvCxnSpPr>
+          <p:nvPr/>
+        </p:nvCxnSpPr>
+        <p:spPr>
+          <a:xfrm flipH="1" flipV="1">
+            <a:off x="582584" y="1535692"/>
+            <a:ext cx="209211" cy="362618"/>
+          </a:xfrm>
+          <a:prstGeom prst="straightConnector1">
+            <a:avLst/>
+          </a:prstGeom>
+          <a:ln w="28575">
+            <a:solidFill>
+              <a:schemeClr val="tx1"/>
+            </a:solidFill>
+            <a:tailEnd type="triangle"/>
+          </a:ln>
+        </p:spPr>
+        <p:style>
+          <a:lnRef idx="1">
+            <a:schemeClr val="accent1"/>
+          </a:lnRef>
+          <a:fillRef idx="0">
+            <a:schemeClr val="accent1"/>
+          </a:fillRef>
+          <a:effectRef idx="0">
+            <a:schemeClr val="accent1"/>
+          </a:effectRef>
+          <a:fontRef idx="minor">
+            <a:schemeClr val="tx1"/>
+          </a:fontRef>
+        </p:style>
+      </p:cxnSp>
+      <p:cxnSp>
+        <p:nvCxnSpPr>
+          <p:cNvPr id="81" name="Straight Arrow Connector 80">
+            <a:extLst>
+              <a:ext uri="{FF2B5EF4-FFF2-40B4-BE49-F238E27FC236}">
+                <a16:creationId xmlns:a16="http://schemas.microsoft.com/office/drawing/2014/main" id="{A164135E-F4E6-B74F-A268-18F7E70E003F}"/>
+              </a:ext>
+            </a:extLst>
+          </p:cNvPr>
+          <p:cNvCxnSpPr>
+            <a:cxnSpLocks/>
+          </p:cNvCxnSpPr>
+          <p:nvPr/>
+        </p:nvCxnSpPr>
+        <p:spPr>
+          <a:xfrm flipH="1" flipV="1">
+            <a:off x="554597" y="1611630"/>
+            <a:ext cx="241878" cy="623324"/>
+          </a:xfrm>
+          <a:prstGeom prst="straightConnector1">
+            <a:avLst/>
+          </a:prstGeom>
+          <a:ln w="28575">
+            <a:solidFill>
+              <a:schemeClr val="tx1"/>
+            </a:solidFill>
+            <a:tailEnd type="triangle"/>
+          </a:ln>
+        </p:spPr>
+        <p:style>
+          <a:lnRef idx="1">
+            <a:schemeClr val="accent1"/>
+          </a:lnRef>
+          <a:fillRef idx="0">
+            <a:schemeClr val="accent1"/>
+          </a:fillRef>
+          <a:effectRef idx="0">
+            <a:schemeClr val="accent1"/>
+          </a:effectRef>
+          <a:fontRef idx="minor">
+            <a:schemeClr val="tx1"/>
+          </a:fontRef>
+        </p:style>
+      </p:cxnSp>
+    </p:spTree>
+    <p:extLst>
+      <p:ext uri="{BB962C8B-B14F-4D97-AF65-F5344CB8AC3E}">
+        <p14:creationId xmlns:p14="http://schemas.microsoft.com/office/powerpoint/2010/main" val="2014996884"/>
+      </p:ext>
+    </p:extLst>
+  </p:cSld>
+  <p:clrMapOvr>
+    <a:masterClrMapping/>
+  </p:clrMapOvr>
+</p:sld>
+</file>
+
 <file path=ppt/theme/theme1.xml><?xml version="1.0" encoding="utf-8"?>
 <a:theme xmlns:a="http://schemas.openxmlformats.org/drawingml/2006/main" name="Office Theme">
   <a:themeElements>

</xml_diff>